<commit_message>
Add I2C wiring pictures
</commit_message>
<xml_diff>
--- a/files/circuit.pptx
+++ b/files/circuit.pptx
@@ -5,11 +5,13 @@
     <p:sldMasterId id="2147484411" r:id="rId1"/>
   </p:sldMasterIdLst>
   <p:notesMasterIdLst>
-    <p:notesMasterId r:id="rId4"/>
+    <p:notesMasterId r:id="rId6"/>
   </p:notesMasterIdLst>
   <p:sldIdLst>
     <p:sldId id="273" r:id="rId2"/>
-    <p:sldId id="274" r:id="rId3"/>
+    <p:sldId id="276" r:id="rId3"/>
+    <p:sldId id="275" r:id="rId4"/>
+    <p:sldId id="274" r:id="rId5"/>
   </p:sldIdLst>
   <p:sldSz cx="12195175" cy="6859588"/>
   <p:notesSz cx="6735763" cy="9866313"/>
@@ -193,7 +195,7 @@
           <a:p>
             <a:fld id="{CF7937CF-54B3-4B79-9B34-6966D19317C1}" type="datetimeFigureOut">
               <a:rPr kumimoji="1" lang="ja-JP" altLang="en-US" smtClean="0"/>
-              <a:t>7/17/16</a:t>
+              <a:t>17/05/01</a:t>
             </a:fld>
             <a:endParaRPr kumimoji="1" lang="ja-JP" altLang="en-US"/>
           </a:p>
@@ -674,7 +676,7 @@
           <a:p>
             <a:fld id="{BE3AE64F-59D5-1541-93FB-F8431E953C54}" type="datetimeFigureOut">
               <a:rPr lang="en-US" smtClean="0"/>
-              <a:t>7/17/16</a:t>
+              <a:t>17/05/01</a:t>
             </a:fld>
             <a:endParaRPr lang="en-US"/>
           </a:p>
@@ -845,7 +847,7 @@
           <a:p>
             <a:fld id="{BE3AE64F-59D5-1541-93FB-F8431E953C54}" type="datetimeFigureOut">
               <a:rPr lang="en-US" smtClean="0"/>
-              <a:t>7/17/16</a:t>
+              <a:t>17/05/01</a:t>
             </a:fld>
             <a:endParaRPr lang="en-US"/>
           </a:p>
@@ -1026,7 +1028,7 @@
           <a:p>
             <a:fld id="{BE3AE64F-59D5-1541-93FB-F8431E953C54}" type="datetimeFigureOut">
               <a:rPr lang="en-US" smtClean="0"/>
-              <a:t>7/17/16</a:t>
+              <a:t>17/05/01</a:t>
             </a:fld>
             <a:endParaRPr lang="en-US"/>
           </a:p>
@@ -1197,7 +1199,7 @@
           <a:p>
             <a:fld id="{BE3AE64F-59D5-1541-93FB-F8431E953C54}" type="datetimeFigureOut">
               <a:rPr lang="en-US" smtClean="0"/>
-              <a:t>7/17/16</a:t>
+              <a:t>17/05/01</a:t>
             </a:fld>
             <a:endParaRPr lang="en-US"/>
           </a:p>
@@ -1444,7 +1446,7 @@
           <a:p>
             <a:fld id="{BE3AE64F-59D5-1541-93FB-F8431E953C54}" type="datetimeFigureOut">
               <a:rPr lang="en-US" smtClean="0"/>
-              <a:t>7/17/16</a:t>
+              <a:t>17/05/01</a:t>
             </a:fld>
             <a:endParaRPr lang="en-US"/>
           </a:p>
@@ -1733,7 +1735,7 @@
           <a:p>
             <a:fld id="{BE3AE64F-59D5-1541-93FB-F8431E953C54}" type="datetimeFigureOut">
               <a:rPr lang="en-US" smtClean="0"/>
-              <a:t>7/17/16</a:t>
+              <a:t>17/05/01</a:t>
             </a:fld>
             <a:endParaRPr lang="en-US"/>
           </a:p>
@@ -2156,7 +2158,7 @@
           <a:p>
             <a:fld id="{BE3AE64F-59D5-1541-93FB-F8431E953C54}" type="datetimeFigureOut">
               <a:rPr lang="en-US" smtClean="0"/>
-              <a:t>7/17/16</a:t>
+              <a:t>17/05/01</a:t>
             </a:fld>
             <a:endParaRPr lang="en-US"/>
           </a:p>
@@ -2275,7 +2277,7 @@
           <a:p>
             <a:fld id="{BE3AE64F-59D5-1541-93FB-F8431E953C54}" type="datetimeFigureOut">
               <a:rPr lang="en-US" smtClean="0"/>
-              <a:t>7/17/16</a:t>
+              <a:t>17/05/01</a:t>
             </a:fld>
             <a:endParaRPr lang="en-US"/>
           </a:p>
@@ -2371,7 +2373,7 @@
           <a:p>
             <a:fld id="{BE3AE64F-59D5-1541-93FB-F8431E953C54}" type="datetimeFigureOut">
               <a:rPr lang="en-US" smtClean="0"/>
-              <a:t>7/17/16</a:t>
+              <a:t>17/05/01</a:t>
             </a:fld>
             <a:endParaRPr lang="en-US"/>
           </a:p>
@@ -2649,7 +2651,7 @@
           <a:p>
             <a:fld id="{BE3AE64F-59D5-1541-93FB-F8431E953C54}" type="datetimeFigureOut">
               <a:rPr lang="en-US" smtClean="0"/>
-              <a:t>7/17/16</a:t>
+              <a:t>17/05/01</a:t>
             </a:fld>
             <a:endParaRPr lang="en-US"/>
           </a:p>
@@ -2903,7 +2905,7 @@
           <a:p>
             <a:fld id="{BE3AE64F-59D5-1541-93FB-F8431E953C54}" type="datetimeFigureOut">
               <a:rPr lang="en-US" smtClean="0"/>
-              <a:t>7/17/16</a:t>
+              <a:t>17/05/01</a:t>
             </a:fld>
             <a:endParaRPr lang="en-US"/>
           </a:p>
@@ -3118,7 +3120,7 @@
             <a:fld id="{62B1B13E-D5AF-485E-81A1-82A140076526}" type="datetime4">
               <a:rPr lang="en-US" smtClean="0"/>
               <a:pPr/>
-              <a:t>July 17, 2016</a:t>
+              <a:t>May 1, 2017</a:t>
             </a:fld>
             <a:endParaRPr lang="en-US" dirty="0"/>
           </a:p>
@@ -3512,7 +3514,7 @@
           <a:p>
             <a:fld id="{BE3AE64F-59D5-1541-93FB-F8431E953C54}" type="datetimeFigureOut">
               <a:rPr lang="en-US" smtClean="0"/>
-              <a:t>7/17/16</a:t>
+              <a:t>17/05/01</a:t>
             </a:fld>
             <a:endParaRPr lang="en-US"/>
           </a:p>
@@ -5773,7 +5775,7 @@
           <a:p>
             <a:fld id="{BE3AE64F-59D5-1541-93FB-F8431E953C54}" type="datetimeFigureOut">
               <a:rPr lang="en-US" smtClean="0"/>
-              <a:t>7/17/16</a:t>
+              <a:t>17/05/01</a:t>
             </a:fld>
             <a:endParaRPr lang="en-US"/>
           </a:p>
@@ -5816,6 +5818,3923 @@
             <a:fld id="{2875A458-CA75-724E-8507-CF6DE86A334B}" type="slidenum">
               <a:rPr lang="en-US" smtClean="0"/>
               <a:t>2</a:t>
+            </a:fld>
+            <a:endParaRPr lang="en-US"/>
+          </a:p>
+        </p:txBody>
+      </p:sp>
+      <p:pic>
+        <p:nvPicPr>
+          <p:cNvPr id="5" name="Picture 4" descr="arduino_lesson.png"/>
+          <p:cNvPicPr>
+            <a:picLocks noChangeAspect="1"/>
+          </p:cNvPicPr>
+          <p:nvPr/>
+        </p:nvPicPr>
+        <p:blipFill>
+          <a:blip r:embed="rId2">
+            <a:extLst>
+              <a:ext uri="{28A0092B-C50C-407E-A947-70E740481C1C}">
+                <a14:useLocalDpi xmlns:a14="http://schemas.microsoft.com/office/drawing/2010/main" val="0"/>
+              </a:ext>
+            </a:extLst>
+          </a:blip>
+          <a:stretch>
+            <a:fillRect/>
+          </a:stretch>
+        </p:blipFill>
+        <p:spPr>
+          <a:xfrm>
+            <a:off x="0" y="-1"/>
+            <a:ext cx="5434298" cy="4347439"/>
+          </a:xfrm>
+          <a:prstGeom prst="rect">
+            <a:avLst/>
+          </a:prstGeom>
+        </p:spPr>
+      </p:pic>
+      <p:grpSp>
+        <p:nvGrpSpPr>
+          <p:cNvPr id="7" name="Group 6"/>
+          <p:cNvGrpSpPr/>
+          <p:nvPr/>
+        </p:nvGrpSpPr>
+        <p:grpSpPr>
+          <a:xfrm>
+            <a:off x="7048836" y="1142034"/>
+            <a:ext cx="1919725" cy="1410465"/>
+            <a:chOff x="4922371" y="2116700"/>
+            <a:chExt cx="4823924" cy="3544244"/>
+          </a:xfrm>
+        </p:grpSpPr>
+        <p:sp>
+          <p:nvSpPr>
+            <p:cNvPr id="8" name="Rectangle 7"/>
+            <p:cNvSpPr/>
+            <p:nvPr/>
+          </p:nvSpPr>
+          <p:spPr>
+            <a:xfrm>
+              <a:off x="4922371" y="2116700"/>
+              <a:ext cx="4823924" cy="3544244"/>
+            </a:xfrm>
+            <a:prstGeom prst="rect">
+              <a:avLst/>
+            </a:prstGeom>
+            <a:solidFill>
+              <a:schemeClr val="accent4">
+                <a:lumMod val="75000"/>
+              </a:schemeClr>
+            </a:solidFill>
+          </p:spPr>
+          <p:style>
+            <a:lnRef idx="1">
+              <a:schemeClr val="accent1"/>
+            </a:lnRef>
+            <a:fillRef idx="3">
+              <a:schemeClr val="accent1"/>
+            </a:fillRef>
+            <a:effectRef idx="2">
+              <a:schemeClr val="accent1"/>
+            </a:effectRef>
+            <a:fontRef idx="minor">
+              <a:schemeClr val="lt1"/>
+            </a:fontRef>
+          </p:style>
+          <p:txBody>
+            <a:bodyPr rtlCol="0" anchor="ctr"/>
+            <a:lstStyle/>
+            <a:p>
+              <a:pPr algn="ctr"/>
+              <a:endParaRPr lang="en-US" sz="1400">
+                <a:latin typeface="Arial Narrow"/>
+                <a:cs typeface="Arial Narrow"/>
+              </a:endParaRPr>
+            </a:p>
+          </p:txBody>
+        </p:sp>
+        <p:grpSp>
+          <p:nvGrpSpPr>
+            <p:cNvPr id="9" name="Group 8"/>
+            <p:cNvGrpSpPr/>
+            <p:nvPr/>
+          </p:nvGrpSpPr>
+          <p:grpSpPr>
+            <a:xfrm>
+              <a:off x="5163593" y="2322324"/>
+              <a:ext cx="355726" cy="390883"/>
+              <a:chOff x="3733253" y="1443578"/>
+              <a:chExt cx="355726" cy="390883"/>
+            </a:xfrm>
+          </p:grpSpPr>
+          <p:sp>
+            <p:nvSpPr>
+              <p:cNvPr id="32" name="Oval 31"/>
+              <p:cNvSpPr/>
+              <p:nvPr/>
+            </p:nvSpPr>
+            <p:spPr>
+              <a:xfrm>
+                <a:off x="3733253" y="1443578"/>
+                <a:ext cx="355726" cy="390883"/>
+              </a:xfrm>
+              <a:prstGeom prst="ellipse">
+                <a:avLst/>
+              </a:prstGeom>
+              <a:solidFill>
+                <a:schemeClr val="bg1">
+                  <a:lumMod val="75000"/>
+                </a:schemeClr>
+              </a:solidFill>
+              <a:ln>
+                <a:noFill/>
+              </a:ln>
+              <a:effectLst/>
+            </p:spPr>
+            <p:style>
+              <a:lnRef idx="1">
+                <a:schemeClr val="accent1"/>
+              </a:lnRef>
+              <a:fillRef idx="3">
+                <a:schemeClr val="accent1"/>
+              </a:fillRef>
+              <a:effectRef idx="2">
+                <a:schemeClr val="accent1"/>
+              </a:effectRef>
+              <a:fontRef idx="minor">
+                <a:schemeClr val="lt1"/>
+              </a:fontRef>
+            </p:style>
+            <p:txBody>
+              <a:bodyPr rtlCol="0" anchor="ctr"/>
+              <a:lstStyle/>
+              <a:p>
+                <a:pPr algn="ctr"/>
+                <a:endParaRPr lang="en-US" sz="1400">
+                  <a:latin typeface="Arial Narrow"/>
+                  <a:cs typeface="Arial Narrow"/>
+                </a:endParaRPr>
+              </a:p>
+            </p:txBody>
+          </p:sp>
+          <p:sp>
+            <p:nvSpPr>
+              <p:cNvPr id="33" name="Oval 32"/>
+              <p:cNvSpPr/>
+              <p:nvPr/>
+            </p:nvSpPr>
+            <p:spPr>
+              <a:xfrm>
+                <a:off x="3807116" y="1532732"/>
+                <a:ext cx="201685" cy="208724"/>
+              </a:xfrm>
+              <a:prstGeom prst="ellipse">
+                <a:avLst/>
+              </a:prstGeom>
+              <a:solidFill>
+                <a:schemeClr val="bg1"/>
+              </a:solidFill>
+              <a:ln>
+                <a:noFill/>
+              </a:ln>
+              <a:effectLst/>
+            </p:spPr>
+            <p:style>
+              <a:lnRef idx="1">
+                <a:schemeClr val="accent1"/>
+              </a:lnRef>
+              <a:fillRef idx="3">
+                <a:schemeClr val="accent1"/>
+              </a:fillRef>
+              <a:effectRef idx="2">
+                <a:schemeClr val="accent1"/>
+              </a:effectRef>
+              <a:fontRef idx="minor">
+                <a:schemeClr val="lt1"/>
+              </a:fontRef>
+            </p:style>
+            <p:txBody>
+              <a:bodyPr rtlCol="0" anchor="ctr"/>
+              <a:lstStyle/>
+              <a:p>
+                <a:pPr algn="ctr"/>
+                <a:endParaRPr lang="en-US" sz="1400">
+                  <a:latin typeface="Arial Narrow"/>
+                  <a:cs typeface="Arial Narrow"/>
+                </a:endParaRPr>
+              </a:p>
+            </p:txBody>
+          </p:sp>
+        </p:grpSp>
+        <p:grpSp>
+          <p:nvGrpSpPr>
+            <p:cNvPr id="10" name="Group 9"/>
+            <p:cNvGrpSpPr/>
+            <p:nvPr/>
+          </p:nvGrpSpPr>
+          <p:grpSpPr>
+            <a:xfrm>
+              <a:off x="5162055" y="2852495"/>
+              <a:ext cx="355726" cy="390883"/>
+              <a:chOff x="3733253" y="1443578"/>
+              <a:chExt cx="355726" cy="390883"/>
+            </a:xfrm>
+          </p:grpSpPr>
+          <p:sp>
+            <p:nvSpPr>
+              <p:cNvPr id="30" name="Oval 29"/>
+              <p:cNvSpPr/>
+              <p:nvPr/>
+            </p:nvSpPr>
+            <p:spPr>
+              <a:xfrm>
+                <a:off x="3733253" y="1443578"/>
+                <a:ext cx="355726" cy="390883"/>
+              </a:xfrm>
+              <a:prstGeom prst="ellipse">
+                <a:avLst/>
+              </a:prstGeom>
+              <a:solidFill>
+                <a:schemeClr val="bg1">
+                  <a:lumMod val="75000"/>
+                </a:schemeClr>
+              </a:solidFill>
+              <a:ln>
+                <a:noFill/>
+              </a:ln>
+              <a:effectLst/>
+            </p:spPr>
+            <p:style>
+              <a:lnRef idx="1">
+                <a:schemeClr val="accent1"/>
+              </a:lnRef>
+              <a:fillRef idx="3">
+                <a:schemeClr val="accent1"/>
+              </a:fillRef>
+              <a:effectRef idx="2">
+                <a:schemeClr val="accent1"/>
+              </a:effectRef>
+              <a:fontRef idx="minor">
+                <a:schemeClr val="lt1"/>
+              </a:fontRef>
+            </p:style>
+            <p:txBody>
+              <a:bodyPr rtlCol="0" anchor="ctr"/>
+              <a:lstStyle/>
+              <a:p>
+                <a:pPr algn="ctr"/>
+                <a:endParaRPr lang="en-US" sz="1400">
+                  <a:latin typeface="Arial Narrow"/>
+                  <a:cs typeface="Arial Narrow"/>
+                </a:endParaRPr>
+              </a:p>
+            </p:txBody>
+          </p:sp>
+          <p:sp>
+            <p:nvSpPr>
+              <p:cNvPr id="31" name="Oval 30"/>
+              <p:cNvSpPr/>
+              <p:nvPr/>
+            </p:nvSpPr>
+            <p:spPr>
+              <a:xfrm>
+                <a:off x="3807116" y="1532732"/>
+                <a:ext cx="201685" cy="208724"/>
+              </a:xfrm>
+              <a:prstGeom prst="ellipse">
+                <a:avLst/>
+              </a:prstGeom>
+              <a:solidFill>
+                <a:schemeClr val="bg1"/>
+              </a:solidFill>
+              <a:ln>
+                <a:noFill/>
+              </a:ln>
+              <a:effectLst/>
+            </p:spPr>
+            <p:style>
+              <a:lnRef idx="1">
+                <a:schemeClr val="accent1"/>
+              </a:lnRef>
+              <a:fillRef idx="3">
+                <a:schemeClr val="accent1"/>
+              </a:fillRef>
+              <a:effectRef idx="2">
+                <a:schemeClr val="accent1"/>
+              </a:effectRef>
+              <a:fontRef idx="minor">
+                <a:schemeClr val="lt1"/>
+              </a:fontRef>
+            </p:style>
+            <p:txBody>
+              <a:bodyPr rtlCol="0" anchor="ctr"/>
+              <a:lstStyle/>
+              <a:p>
+                <a:pPr algn="ctr"/>
+                <a:endParaRPr lang="en-US" sz="1400">
+                  <a:latin typeface="Arial Narrow"/>
+                  <a:cs typeface="Arial Narrow"/>
+                </a:endParaRPr>
+              </a:p>
+            </p:txBody>
+          </p:sp>
+        </p:grpSp>
+        <p:grpSp>
+          <p:nvGrpSpPr>
+            <p:cNvPr id="11" name="Group 10"/>
+            <p:cNvGrpSpPr/>
+            <p:nvPr/>
+          </p:nvGrpSpPr>
+          <p:grpSpPr>
+            <a:xfrm>
+              <a:off x="5160517" y="3382666"/>
+              <a:ext cx="355726" cy="390883"/>
+              <a:chOff x="3733253" y="1443578"/>
+              <a:chExt cx="355726" cy="390883"/>
+            </a:xfrm>
+          </p:grpSpPr>
+          <p:sp>
+            <p:nvSpPr>
+              <p:cNvPr id="28" name="Oval 27"/>
+              <p:cNvSpPr/>
+              <p:nvPr/>
+            </p:nvSpPr>
+            <p:spPr>
+              <a:xfrm>
+                <a:off x="3733253" y="1443578"/>
+                <a:ext cx="355726" cy="390883"/>
+              </a:xfrm>
+              <a:prstGeom prst="ellipse">
+                <a:avLst/>
+              </a:prstGeom>
+              <a:solidFill>
+                <a:schemeClr val="bg1">
+                  <a:lumMod val="75000"/>
+                </a:schemeClr>
+              </a:solidFill>
+              <a:ln>
+                <a:noFill/>
+              </a:ln>
+              <a:effectLst/>
+            </p:spPr>
+            <p:style>
+              <a:lnRef idx="1">
+                <a:schemeClr val="accent1"/>
+              </a:lnRef>
+              <a:fillRef idx="3">
+                <a:schemeClr val="accent1"/>
+              </a:fillRef>
+              <a:effectRef idx="2">
+                <a:schemeClr val="accent1"/>
+              </a:effectRef>
+              <a:fontRef idx="minor">
+                <a:schemeClr val="lt1"/>
+              </a:fontRef>
+            </p:style>
+            <p:txBody>
+              <a:bodyPr rtlCol="0" anchor="ctr"/>
+              <a:lstStyle/>
+              <a:p>
+                <a:pPr algn="ctr"/>
+                <a:endParaRPr lang="en-US" sz="1400">
+                  <a:latin typeface="Arial Narrow"/>
+                  <a:cs typeface="Arial Narrow"/>
+                </a:endParaRPr>
+              </a:p>
+            </p:txBody>
+          </p:sp>
+          <p:sp>
+            <p:nvSpPr>
+              <p:cNvPr id="29" name="Oval 28"/>
+              <p:cNvSpPr/>
+              <p:nvPr/>
+            </p:nvSpPr>
+            <p:spPr>
+              <a:xfrm>
+                <a:off x="3807116" y="1532732"/>
+                <a:ext cx="201685" cy="208724"/>
+              </a:xfrm>
+              <a:prstGeom prst="ellipse">
+                <a:avLst/>
+              </a:prstGeom>
+              <a:solidFill>
+                <a:schemeClr val="bg1"/>
+              </a:solidFill>
+              <a:ln>
+                <a:noFill/>
+              </a:ln>
+              <a:effectLst/>
+            </p:spPr>
+            <p:style>
+              <a:lnRef idx="1">
+                <a:schemeClr val="accent1"/>
+              </a:lnRef>
+              <a:fillRef idx="3">
+                <a:schemeClr val="accent1"/>
+              </a:fillRef>
+              <a:effectRef idx="2">
+                <a:schemeClr val="accent1"/>
+              </a:effectRef>
+              <a:fontRef idx="minor">
+                <a:schemeClr val="lt1"/>
+              </a:fontRef>
+            </p:style>
+            <p:txBody>
+              <a:bodyPr rtlCol="0" anchor="ctr"/>
+              <a:lstStyle/>
+              <a:p>
+                <a:pPr algn="ctr"/>
+                <a:endParaRPr lang="en-US" sz="1400">
+                  <a:latin typeface="Arial Narrow"/>
+                  <a:cs typeface="Arial Narrow"/>
+                </a:endParaRPr>
+              </a:p>
+            </p:txBody>
+          </p:sp>
+        </p:grpSp>
+        <p:grpSp>
+          <p:nvGrpSpPr>
+            <p:cNvPr id="12" name="Group 11"/>
+            <p:cNvGrpSpPr/>
+            <p:nvPr/>
+          </p:nvGrpSpPr>
+          <p:grpSpPr>
+            <a:xfrm>
+              <a:off x="5165262" y="3912837"/>
+              <a:ext cx="355726" cy="390883"/>
+              <a:chOff x="3733253" y="1443578"/>
+              <a:chExt cx="355726" cy="390883"/>
+            </a:xfrm>
+          </p:grpSpPr>
+          <p:sp>
+            <p:nvSpPr>
+              <p:cNvPr id="26" name="Oval 25"/>
+              <p:cNvSpPr/>
+              <p:nvPr/>
+            </p:nvSpPr>
+            <p:spPr>
+              <a:xfrm>
+                <a:off x="3733253" y="1443578"/>
+                <a:ext cx="355726" cy="390883"/>
+              </a:xfrm>
+              <a:prstGeom prst="ellipse">
+                <a:avLst/>
+              </a:prstGeom>
+              <a:solidFill>
+                <a:schemeClr val="bg1">
+                  <a:lumMod val="75000"/>
+                </a:schemeClr>
+              </a:solidFill>
+              <a:ln>
+                <a:noFill/>
+              </a:ln>
+              <a:effectLst/>
+            </p:spPr>
+            <p:style>
+              <a:lnRef idx="1">
+                <a:schemeClr val="accent1"/>
+              </a:lnRef>
+              <a:fillRef idx="3">
+                <a:schemeClr val="accent1"/>
+              </a:fillRef>
+              <a:effectRef idx="2">
+                <a:schemeClr val="accent1"/>
+              </a:effectRef>
+              <a:fontRef idx="minor">
+                <a:schemeClr val="lt1"/>
+              </a:fontRef>
+            </p:style>
+            <p:txBody>
+              <a:bodyPr rtlCol="0" anchor="ctr"/>
+              <a:lstStyle/>
+              <a:p>
+                <a:pPr algn="ctr"/>
+                <a:endParaRPr lang="en-US" sz="1400">
+                  <a:latin typeface="Arial Narrow"/>
+                  <a:cs typeface="Arial Narrow"/>
+                </a:endParaRPr>
+              </a:p>
+            </p:txBody>
+          </p:sp>
+          <p:sp>
+            <p:nvSpPr>
+              <p:cNvPr id="27" name="Oval 26"/>
+              <p:cNvSpPr/>
+              <p:nvPr/>
+            </p:nvSpPr>
+            <p:spPr>
+              <a:xfrm>
+                <a:off x="3807116" y="1532732"/>
+                <a:ext cx="201685" cy="208724"/>
+              </a:xfrm>
+              <a:prstGeom prst="ellipse">
+                <a:avLst/>
+              </a:prstGeom>
+              <a:solidFill>
+                <a:schemeClr val="bg1"/>
+              </a:solidFill>
+              <a:ln>
+                <a:noFill/>
+              </a:ln>
+              <a:effectLst/>
+            </p:spPr>
+            <p:style>
+              <a:lnRef idx="1">
+                <a:schemeClr val="accent1"/>
+              </a:lnRef>
+              <a:fillRef idx="3">
+                <a:schemeClr val="accent1"/>
+              </a:fillRef>
+              <a:effectRef idx="2">
+                <a:schemeClr val="accent1"/>
+              </a:effectRef>
+              <a:fontRef idx="minor">
+                <a:schemeClr val="lt1"/>
+              </a:fontRef>
+            </p:style>
+            <p:txBody>
+              <a:bodyPr rtlCol="0" anchor="ctr"/>
+              <a:lstStyle/>
+              <a:p>
+                <a:pPr algn="ctr"/>
+                <a:endParaRPr lang="en-US" sz="1400">
+                  <a:latin typeface="Arial Narrow"/>
+                  <a:cs typeface="Arial Narrow"/>
+                </a:endParaRPr>
+              </a:p>
+            </p:txBody>
+          </p:sp>
+        </p:grpSp>
+        <p:grpSp>
+          <p:nvGrpSpPr>
+            <p:cNvPr id="13" name="Group 12"/>
+            <p:cNvGrpSpPr/>
+            <p:nvPr/>
+          </p:nvGrpSpPr>
+          <p:grpSpPr>
+            <a:xfrm>
+              <a:off x="5163724" y="4443008"/>
+              <a:ext cx="355726" cy="390883"/>
+              <a:chOff x="3733253" y="1443578"/>
+              <a:chExt cx="355726" cy="390883"/>
+            </a:xfrm>
+          </p:grpSpPr>
+          <p:sp>
+            <p:nvSpPr>
+              <p:cNvPr id="24" name="Oval 23"/>
+              <p:cNvSpPr/>
+              <p:nvPr/>
+            </p:nvSpPr>
+            <p:spPr>
+              <a:xfrm>
+                <a:off x="3733253" y="1443578"/>
+                <a:ext cx="355726" cy="390883"/>
+              </a:xfrm>
+              <a:prstGeom prst="ellipse">
+                <a:avLst/>
+              </a:prstGeom>
+              <a:solidFill>
+                <a:schemeClr val="bg1">
+                  <a:lumMod val="75000"/>
+                </a:schemeClr>
+              </a:solidFill>
+              <a:ln>
+                <a:noFill/>
+              </a:ln>
+              <a:effectLst/>
+            </p:spPr>
+            <p:style>
+              <a:lnRef idx="1">
+                <a:schemeClr val="accent1"/>
+              </a:lnRef>
+              <a:fillRef idx="3">
+                <a:schemeClr val="accent1"/>
+              </a:fillRef>
+              <a:effectRef idx="2">
+                <a:schemeClr val="accent1"/>
+              </a:effectRef>
+              <a:fontRef idx="minor">
+                <a:schemeClr val="lt1"/>
+              </a:fontRef>
+            </p:style>
+            <p:txBody>
+              <a:bodyPr rtlCol="0" anchor="ctr"/>
+              <a:lstStyle/>
+              <a:p>
+                <a:pPr algn="ctr"/>
+                <a:endParaRPr lang="en-US" sz="1400">
+                  <a:latin typeface="Arial Narrow"/>
+                  <a:cs typeface="Arial Narrow"/>
+                </a:endParaRPr>
+              </a:p>
+            </p:txBody>
+          </p:sp>
+          <p:sp>
+            <p:nvSpPr>
+              <p:cNvPr id="25" name="Oval 24"/>
+              <p:cNvSpPr/>
+              <p:nvPr/>
+            </p:nvSpPr>
+            <p:spPr>
+              <a:xfrm>
+                <a:off x="3807116" y="1532732"/>
+                <a:ext cx="201685" cy="208724"/>
+              </a:xfrm>
+              <a:prstGeom prst="ellipse">
+                <a:avLst/>
+              </a:prstGeom>
+              <a:solidFill>
+                <a:schemeClr val="bg1"/>
+              </a:solidFill>
+              <a:ln>
+                <a:noFill/>
+              </a:ln>
+              <a:effectLst/>
+            </p:spPr>
+            <p:style>
+              <a:lnRef idx="1">
+                <a:schemeClr val="accent1"/>
+              </a:lnRef>
+              <a:fillRef idx="3">
+                <a:schemeClr val="accent1"/>
+              </a:fillRef>
+              <a:effectRef idx="2">
+                <a:schemeClr val="accent1"/>
+              </a:effectRef>
+              <a:fontRef idx="minor">
+                <a:schemeClr val="lt1"/>
+              </a:fontRef>
+            </p:style>
+            <p:txBody>
+              <a:bodyPr rtlCol="0" anchor="ctr"/>
+              <a:lstStyle/>
+              <a:p>
+                <a:pPr algn="ctr"/>
+                <a:endParaRPr lang="en-US" sz="1400">
+                  <a:latin typeface="Arial Narrow"/>
+                  <a:cs typeface="Arial Narrow"/>
+                </a:endParaRPr>
+              </a:p>
+            </p:txBody>
+          </p:sp>
+        </p:grpSp>
+        <p:grpSp>
+          <p:nvGrpSpPr>
+            <p:cNvPr id="14" name="Group 13"/>
+            <p:cNvGrpSpPr/>
+            <p:nvPr/>
+          </p:nvGrpSpPr>
+          <p:grpSpPr>
+            <a:xfrm>
+              <a:off x="5162186" y="4973180"/>
+              <a:ext cx="355726" cy="390883"/>
+              <a:chOff x="3733253" y="1443578"/>
+              <a:chExt cx="355726" cy="390883"/>
+            </a:xfrm>
+          </p:grpSpPr>
+          <p:sp>
+            <p:nvSpPr>
+              <p:cNvPr id="22" name="Oval 21"/>
+              <p:cNvSpPr/>
+              <p:nvPr/>
+            </p:nvSpPr>
+            <p:spPr>
+              <a:xfrm>
+                <a:off x="3733253" y="1443578"/>
+                <a:ext cx="355726" cy="390883"/>
+              </a:xfrm>
+              <a:prstGeom prst="ellipse">
+                <a:avLst/>
+              </a:prstGeom>
+              <a:solidFill>
+                <a:schemeClr val="bg1">
+                  <a:lumMod val="75000"/>
+                </a:schemeClr>
+              </a:solidFill>
+              <a:ln>
+                <a:noFill/>
+              </a:ln>
+              <a:effectLst/>
+            </p:spPr>
+            <p:style>
+              <a:lnRef idx="1">
+                <a:schemeClr val="accent1"/>
+              </a:lnRef>
+              <a:fillRef idx="3">
+                <a:schemeClr val="accent1"/>
+              </a:fillRef>
+              <a:effectRef idx="2">
+                <a:schemeClr val="accent1"/>
+              </a:effectRef>
+              <a:fontRef idx="minor">
+                <a:schemeClr val="lt1"/>
+              </a:fontRef>
+            </p:style>
+            <p:txBody>
+              <a:bodyPr rtlCol="0" anchor="ctr"/>
+              <a:lstStyle/>
+              <a:p>
+                <a:pPr algn="ctr"/>
+                <a:endParaRPr lang="en-US" sz="1400">
+                  <a:latin typeface="Arial Narrow"/>
+                  <a:cs typeface="Arial Narrow"/>
+                </a:endParaRPr>
+              </a:p>
+            </p:txBody>
+          </p:sp>
+          <p:sp>
+            <p:nvSpPr>
+              <p:cNvPr id="23" name="Oval 22"/>
+              <p:cNvSpPr/>
+              <p:nvPr/>
+            </p:nvSpPr>
+            <p:spPr>
+              <a:xfrm>
+                <a:off x="3807116" y="1532732"/>
+                <a:ext cx="201685" cy="208724"/>
+              </a:xfrm>
+              <a:prstGeom prst="ellipse">
+                <a:avLst/>
+              </a:prstGeom>
+              <a:solidFill>
+                <a:schemeClr val="bg1"/>
+              </a:solidFill>
+              <a:ln>
+                <a:noFill/>
+              </a:ln>
+              <a:effectLst/>
+            </p:spPr>
+            <p:style>
+              <a:lnRef idx="1">
+                <a:schemeClr val="accent1"/>
+              </a:lnRef>
+              <a:fillRef idx="3">
+                <a:schemeClr val="accent1"/>
+              </a:fillRef>
+              <a:effectRef idx="2">
+                <a:schemeClr val="accent1"/>
+              </a:effectRef>
+              <a:fontRef idx="minor">
+                <a:schemeClr val="lt1"/>
+              </a:fontRef>
+            </p:style>
+            <p:txBody>
+              <a:bodyPr rtlCol="0" anchor="ctr"/>
+              <a:lstStyle/>
+              <a:p>
+                <a:pPr algn="ctr"/>
+                <a:endParaRPr lang="en-US" sz="1400">
+                  <a:latin typeface="Arial Narrow"/>
+                  <a:cs typeface="Arial Narrow"/>
+                </a:endParaRPr>
+              </a:p>
+            </p:txBody>
+          </p:sp>
+        </p:grpSp>
+        <p:sp>
+          <p:nvSpPr>
+            <p:cNvPr id="15" name="TextBox 14"/>
+            <p:cNvSpPr txBox="1"/>
+            <p:nvPr/>
+          </p:nvSpPr>
+          <p:spPr>
+            <a:xfrm>
+              <a:off x="5641038" y="2130586"/>
+              <a:ext cx="1276221" cy="773388"/>
+            </a:xfrm>
+            <a:prstGeom prst="rect">
+              <a:avLst/>
+            </a:prstGeom>
+            <a:noFill/>
+          </p:spPr>
+          <p:txBody>
+            <a:bodyPr wrap="none" rtlCol="0">
+              <a:spAutoFit/>
+            </a:bodyPr>
+            <a:lstStyle/>
+            <a:p>
+              <a:r>
+                <a:rPr lang="en-US" sz="1400" dirty="0" smtClean="0">
+                  <a:solidFill>
+                    <a:schemeClr val="bg1">
+                      <a:lumMod val="95000"/>
+                    </a:schemeClr>
+                  </a:solidFill>
+                  <a:latin typeface="Arial Narrow"/>
+                  <a:cs typeface="Arial Narrow"/>
+                </a:rPr>
+                <a:t>VCC</a:t>
+              </a:r>
+              <a:endParaRPr lang="en-US" sz="1400" dirty="0">
+                <a:solidFill>
+                  <a:schemeClr val="bg1">
+                    <a:lumMod val="95000"/>
+                  </a:schemeClr>
+                </a:solidFill>
+                <a:latin typeface="Arial Narrow"/>
+                <a:cs typeface="Arial Narrow"/>
+              </a:endParaRPr>
+            </a:p>
+          </p:txBody>
+        </p:sp>
+        <p:sp>
+          <p:nvSpPr>
+            <p:cNvPr id="16" name="TextBox 15"/>
+            <p:cNvSpPr txBox="1"/>
+            <p:nvPr/>
+          </p:nvSpPr>
+          <p:spPr>
+            <a:xfrm>
+              <a:off x="5641038" y="2663087"/>
+              <a:ext cx="1317414" cy="773388"/>
+            </a:xfrm>
+            <a:prstGeom prst="rect">
+              <a:avLst/>
+            </a:prstGeom>
+            <a:noFill/>
+          </p:spPr>
+          <p:txBody>
+            <a:bodyPr wrap="none" rtlCol="0">
+              <a:spAutoFit/>
+            </a:bodyPr>
+            <a:lstStyle/>
+            <a:p>
+              <a:r>
+                <a:rPr lang="en-US" sz="1400" dirty="0" smtClean="0">
+                  <a:solidFill>
+                    <a:schemeClr val="bg1">
+                      <a:lumMod val="95000"/>
+                    </a:schemeClr>
+                  </a:solidFill>
+                  <a:latin typeface="Arial Narrow"/>
+                  <a:cs typeface="Arial Narrow"/>
+                </a:rPr>
+                <a:t>GND</a:t>
+              </a:r>
+              <a:endParaRPr lang="en-US" sz="1400" dirty="0">
+                <a:solidFill>
+                  <a:schemeClr val="bg1">
+                    <a:lumMod val="95000"/>
+                  </a:schemeClr>
+                </a:solidFill>
+                <a:latin typeface="Arial Narrow"/>
+                <a:cs typeface="Arial Narrow"/>
+              </a:endParaRPr>
+            </a:p>
+          </p:txBody>
+        </p:sp>
+        <p:sp>
+          <p:nvSpPr>
+            <p:cNvPr id="17" name="TextBox 16"/>
+            <p:cNvSpPr txBox="1"/>
+            <p:nvPr/>
+          </p:nvSpPr>
+          <p:spPr>
+            <a:xfrm>
+              <a:off x="5641038" y="3195589"/>
+              <a:ext cx="1237421" cy="773388"/>
+            </a:xfrm>
+            <a:prstGeom prst="rect">
+              <a:avLst/>
+            </a:prstGeom>
+            <a:noFill/>
+          </p:spPr>
+          <p:txBody>
+            <a:bodyPr wrap="none" rtlCol="0">
+              <a:spAutoFit/>
+            </a:bodyPr>
+            <a:lstStyle/>
+            <a:p>
+              <a:r>
+                <a:rPr lang="en-US" sz="1400" dirty="0" smtClean="0">
+                  <a:solidFill>
+                    <a:schemeClr val="bg1">
+                      <a:lumMod val="95000"/>
+                    </a:schemeClr>
+                  </a:solidFill>
+                  <a:latin typeface="Arial Narrow"/>
+                  <a:cs typeface="Arial Narrow"/>
+                </a:rPr>
+                <a:t>SCX</a:t>
+              </a:r>
+              <a:endParaRPr lang="en-US" sz="1400" dirty="0">
+                <a:solidFill>
+                  <a:schemeClr val="bg1">
+                    <a:lumMod val="95000"/>
+                  </a:schemeClr>
+                </a:solidFill>
+                <a:latin typeface="Arial Narrow"/>
+                <a:cs typeface="Arial Narrow"/>
+              </a:endParaRPr>
+            </a:p>
+          </p:txBody>
+        </p:sp>
+        <p:sp>
+          <p:nvSpPr>
+            <p:cNvPr id="18" name="TextBox 17"/>
+            <p:cNvSpPr txBox="1"/>
+            <p:nvPr/>
+          </p:nvSpPr>
+          <p:spPr>
+            <a:xfrm>
+              <a:off x="5641038" y="3728093"/>
+              <a:ext cx="1237421" cy="773388"/>
+            </a:xfrm>
+            <a:prstGeom prst="rect">
+              <a:avLst/>
+            </a:prstGeom>
+            <a:noFill/>
+          </p:spPr>
+          <p:txBody>
+            <a:bodyPr wrap="none" rtlCol="0">
+              <a:spAutoFit/>
+            </a:bodyPr>
+            <a:lstStyle/>
+            <a:p>
+              <a:r>
+                <a:rPr lang="en-US" sz="1400" dirty="0" smtClean="0">
+                  <a:solidFill>
+                    <a:schemeClr val="bg1">
+                      <a:lumMod val="95000"/>
+                    </a:schemeClr>
+                  </a:solidFill>
+                  <a:latin typeface="Arial Narrow"/>
+                  <a:cs typeface="Arial Narrow"/>
+                </a:rPr>
+                <a:t>SDX</a:t>
+              </a:r>
+              <a:endParaRPr lang="en-US" sz="1400" dirty="0">
+                <a:solidFill>
+                  <a:schemeClr val="bg1">
+                    <a:lumMod val="95000"/>
+                  </a:schemeClr>
+                </a:solidFill>
+                <a:latin typeface="Arial Narrow"/>
+                <a:cs typeface="Arial Narrow"/>
+              </a:endParaRPr>
+            </a:p>
+          </p:txBody>
+        </p:sp>
+        <p:sp>
+          <p:nvSpPr>
+            <p:cNvPr id="19" name="TextBox 18"/>
+            <p:cNvSpPr txBox="1"/>
+            <p:nvPr/>
+          </p:nvSpPr>
+          <p:spPr>
+            <a:xfrm>
+              <a:off x="5641038" y="4260595"/>
+              <a:ext cx="1301870" cy="773388"/>
+            </a:xfrm>
+            <a:prstGeom prst="rect">
+              <a:avLst/>
+            </a:prstGeom>
+            <a:noFill/>
+          </p:spPr>
+          <p:txBody>
+            <a:bodyPr wrap="none" rtlCol="0">
+              <a:spAutoFit/>
+            </a:bodyPr>
+            <a:lstStyle/>
+            <a:p>
+              <a:r>
+                <a:rPr lang="en-US" sz="1400" dirty="0" smtClean="0">
+                  <a:solidFill>
+                    <a:schemeClr val="bg1">
+                      <a:lumMod val="95000"/>
+                    </a:schemeClr>
+                  </a:solidFill>
+                  <a:latin typeface="Arial Narrow"/>
+                  <a:cs typeface="Arial Narrow"/>
+                </a:rPr>
+                <a:t>SDO</a:t>
+              </a:r>
+              <a:endParaRPr lang="en-US" sz="1400" dirty="0">
+                <a:solidFill>
+                  <a:schemeClr val="bg1">
+                    <a:lumMod val="95000"/>
+                  </a:schemeClr>
+                </a:solidFill>
+                <a:latin typeface="Arial Narrow"/>
+                <a:cs typeface="Arial Narrow"/>
+              </a:endParaRPr>
+            </a:p>
+          </p:txBody>
+        </p:sp>
+        <p:sp>
+          <p:nvSpPr>
+            <p:cNvPr id="20" name="TextBox 19"/>
+            <p:cNvSpPr txBox="1"/>
+            <p:nvPr/>
+          </p:nvSpPr>
+          <p:spPr>
+            <a:xfrm>
+              <a:off x="5641038" y="4793094"/>
+              <a:ext cx="1224455" cy="773388"/>
+            </a:xfrm>
+            <a:prstGeom prst="rect">
+              <a:avLst/>
+            </a:prstGeom>
+            <a:noFill/>
+          </p:spPr>
+          <p:txBody>
+            <a:bodyPr wrap="none" rtlCol="0">
+              <a:spAutoFit/>
+            </a:bodyPr>
+            <a:lstStyle/>
+            <a:p>
+              <a:r>
+                <a:rPr lang="en-US" sz="1400" dirty="0" smtClean="0">
+                  <a:solidFill>
+                    <a:schemeClr val="bg1">
+                      <a:lumMod val="95000"/>
+                    </a:schemeClr>
+                  </a:solidFill>
+                  <a:latin typeface="Arial Narrow"/>
+                  <a:cs typeface="Arial Narrow"/>
+                </a:rPr>
+                <a:t>CSB</a:t>
+              </a:r>
+              <a:endParaRPr lang="en-US" sz="1400" dirty="0">
+                <a:solidFill>
+                  <a:schemeClr val="bg1">
+                    <a:lumMod val="95000"/>
+                  </a:schemeClr>
+                </a:solidFill>
+                <a:latin typeface="Arial Narrow"/>
+                <a:cs typeface="Arial Narrow"/>
+              </a:endParaRPr>
+            </a:p>
+          </p:txBody>
+        </p:sp>
+        <p:sp>
+          <p:nvSpPr>
+            <p:cNvPr id="21" name="Rectangle 20"/>
+            <p:cNvSpPr/>
+            <p:nvPr/>
+          </p:nvSpPr>
+          <p:spPr>
+            <a:xfrm>
+              <a:off x="7363867" y="3504862"/>
+              <a:ext cx="895872" cy="797455"/>
+            </a:xfrm>
+            <a:prstGeom prst="rect">
+              <a:avLst/>
+            </a:prstGeom>
+            <a:solidFill>
+              <a:schemeClr val="tx1">
+                <a:lumMod val="65000"/>
+                <a:lumOff val="35000"/>
+              </a:schemeClr>
+            </a:solidFill>
+          </p:spPr>
+          <p:style>
+            <a:lnRef idx="2">
+              <a:schemeClr val="dk1"/>
+            </a:lnRef>
+            <a:fillRef idx="1">
+              <a:schemeClr val="lt1"/>
+            </a:fillRef>
+            <a:effectRef idx="0">
+              <a:schemeClr val="dk1"/>
+            </a:effectRef>
+            <a:fontRef idx="minor">
+              <a:schemeClr val="dk1"/>
+            </a:fontRef>
+          </p:style>
+          <p:txBody>
+            <a:bodyPr rtlCol="0" anchor="ctr"/>
+            <a:lstStyle/>
+            <a:p>
+              <a:pPr algn="ctr"/>
+              <a:endParaRPr lang="en-US" sz="1400">
+                <a:latin typeface="Arial Narrow"/>
+                <a:cs typeface="Arial Narrow"/>
+              </a:endParaRPr>
+            </a:p>
+          </p:txBody>
+        </p:sp>
+      </p:grpSp>
+      <p:sp>
+        <p:nvSpPr>
+          <p:cNvPr id="36" name="Rectangle 35"/>
+          <p:cNvSpPr/>
+          <p:nvPr/>
+        </p:nvSpPr>
+        <p:spPr>
+          <a:xfrm>
+            <a:off x="2963267" y="659622"/>
+            <a:ext cx="157516" cy="157522"/>
+          </a:xfrm>
+          <a:prstGeom prst="rect">
+            <a:avLst/>
+          </a:prstGeom>
+          <a:noFill/>
+          <a:ln>
+            <a:noFill/>
+          </a:ln>
+        </p:spPr>
+        <p:style>
+          <a:lnRef idx="1">
+            <a:schemeClr val="accent1"/>
+          </a:lnRef>
+          <a:fillRef idx="3">
+            <a:schemeClr val="accent1"/>
+          </a:fillRef>
+          <a:effectRef idx="2">
+            <a:schemeClr val="accent1"/>
+          </a:effectRef>
+          <a:fontRef idx="minor">
+            <a:schemeClr val="lt1"/>
+          </a:fontRef>
+        </p:style>
+        <p:txBody>
+          <a:bodyPr rtlCol="0" anchor="ctr"/>
+          <a:lstStyle/>
+          <a:p>
+            <a:pPr algn="ctr"/>
+            <a:endParaRPr lang="en-US"/>
+          </a:p>
+        </p:txBody>
+      </p:sp>
+      <p:sp>
+        <p:nvSpPr>
+          <p:cNvPr id="37" name="Rectangle 36"/>
+          <p:cNvSpPr/>
+          <p:nvPr/>
+        </p:nvSpPr>
+        <p:spPr>
+          <a:xfrm>
+            <a:off x="4543155" y="1826069"/>
+            <a:ext cx="157516" cy="157522"/>
+          </a:xfrm>
+          <a:prstGeom prst="rect">
+            <a:avLst/>
+          </a:prstGeom>
+          <a:noFill/>
+          <a:ln>
+            <a:noFill/>
+          </a:ln>
+        </p:spPr>
+        <p:style>
+          <a:lnRef idx="1">
+            <a:schemeClr val="accent1"/>
+          </a:lnRef>
+          <a:fillRef idx="3">
+            <a:schemeClr val="accent1"/>
+          </a:fillRef>
+          <a:effectRef idx="2">
+            <a:schemeClr val="accent1"/>
+          </a:effectRef>
+          <a:fontRef idx="minor">
+            <a:schemeClr val="lt1"/>
+          </a:fontRef>
+        </p:style>
+        <p:txBody>
+          <a:bodyPr rtlCol="0" anchor="ctr"/>
+          <a:lstStyle/>
+          <a:p>
+            <a:pPr algn="ctr"/>
+            <a:endParaRPr lang="en-US"/>
+          </a:p>
+        </p:txBody>
+      </p:sp>
+      <p:sp>
+        <p:nvSpPr>
+          <p:cNvPr id="38" name="Rectangle 37"/>
+          <p:cNvSpPr/>
+          <p:nvPr/>
+        </p:nvSpPr>
+        <p:spPr>
+          <a:xfrm>
+            <a:off x="4705719" y="1826977"/>
+            <a:ext cx="157516" cy="157522"/>
+          </a:xfrm>
+          <a:prstGeom prst="rect">
+            <a:avLst/>
+          </a:prstGeom>
+          <a:noFill/>
+          <a:ln>
+            <a:noFill/>
+          </a:ln>
+        </p:spPr>
+        <p:style>
+          <a:lnRef idx="1">
+            <a:schemeClr val="accent1"/>
+          </a:lnRef>
+          <a:fillRef idx="3">
+            <a:schemeClr val="accent1"/>
+          </a:fillRef>
+          <a:effectRef idx="2">
+            <a:schemeClr val="accent1"/>
+          </a:effectRef>
+          <a:fontRef idx="minor">
+            <a:schemeClr val="lt1"/>
+          </a:fontRef>
+        </p:style>
+        <p:txBody>
+          <a:bodyPr rtlCol="0" anchor="ctr"/>
+          <a:lstStyle/>
+          <a:p>
+            <a:pPr algn="ctr"/>
+            <a:endParaRPr lang="en-US"/>
+          </a:p>
+        </p:txBody>
+      </p:sp>
+      <p:sp>
+        <p:nvSpPr>
+          <p:cNvPr id="39" name="Rectangle 38"/>
+          <p:cNvSpPr/>
+          <p:nvPr/>
+        </p:nvSpPr>
+        <p:spPr>
+          <a:xfrm>
+            <a:off x="4544070" y="1982604"/>
+            <a:ext cx="157516" cy="157522"/>
+          </a:xfrm>
+          <a:prstGeom prst="rect">
+            <a:avLst/>
+          </a:prstGeom>
+          <a:noFill/>
+          <a:ln>
+            <a:noFill/>
+          </a:ln>
+        </p:spPr>
+        <p:style>
+          <a:lnRef idx="1">
+            <a:schemeClr val="accent1"/>
+          </a:lnRef>
+          <a:fillRef idx="3">
+            <a:schemeClr val="accent1"/>
+          </a:fillRef>
+          <a:effectRef idx="2">
+            <a:schemeClr val="accent1"/>
+          </a:effectRef>
+          <a:fontRef idx="minor">
+            <a:schemeClr val="lt1"/>
+          </a:fontRef>
+        </p:style>
+        <p:txBody>
+          <a:bodyPr rtlCol="0" anchor="ctr"/>
+          <a:lstStyle/>
+          <a:p>
+            <a:pPr algn="ctr"/>
+            <a:endParaRPr lang="en-US"/>
+          </a:p>
+        </p:txBody>
+      </p:sp>
+      <p:sp>
+        <p:nvSpPr>
+          <p:cNvPr id="40" name="Rectangle 39"/>
+          <p:cNvSpPr/>
+          <p:nvPr/>
+        </p:nvSpPr>
+        <p:spPr>
+          <a:xfrm>
+            <a:off x="4709809" y="1986687"/>
+            <a:ext cx="157516" cy="157522"/>
+          </a:xfrm>
+          <a:prstGeom prst="rect">
+            <a:avLst/>
+          </a:prstGeom>
+          <a:noFill/>
+          <a:ln>
+            <a:noFill/>
+          </a:ln>
+        </p:spPr>
+        <p:style>
+          <a:lnRef idx="1">
+            <a:schemeClr val="accent1"/>
+          </a:lnRef>
+          <a:fillRef idx="3">
+            <a:schemeClr val="accent1"/>
+          </a:fillRef>
+          <a:effectRef idx="2">
+            <a:schemeClr val="accent1"/>
+          </a:effectRef>
+          <a:fontRef idx="minor">
+            <a:schemeClr val="lt1"/>
+          </a:fontRef>
+        </p:style>
+        <p:txBody>
+          <a:bodyPr rtlCol="0" anchor="ctr"/>
+          <a:lstStyle/>
+          <a:p>
+            <a:pPr algn="ctr"/>
+            <a:endParaRPr lang="en-US"/>
+          </a:p>
+        </p:txBody>
+      </p:sp>
+      <p:sp>
+        <p:nvSpPr>
+          <p:cNvPr id="41" name="Rectangle 40"/>
+          <p:cNvSpPr/>
+          <p:nvPr/>
+        </p:nvSpPr>
+        <p:spPr>
+          <a:xfrm>
+            <a:off x="4542129" y="2141354"/>
+            <a:ext cx="157516" cy="157522"/>
+          </a:xfrm>
+          <a:prstGeom prst="rect">
+            <a:avLst/>
+          </a:prstGeom>
+          <a:noFill/>
+          <a:ln>
+            <a:noFill/>
+          </a:ln>
+        </p:spPr>
+        <p:style>
+          <a:lnRef idx="1">
+            <a:schemeClr val="accent1"/>
+          </a:lnRef>
+          <a:fillRef idx="3">
+            <a:schemeClr val="accent1"/>
+          </a:fillRef>
+          <a:effectRef idx="2">
+            <a:schemeClr val="accent1"/>
+          </a:effectRef>
+          <a:fontRef idx="minor">
+            <a:schemeClr val="lt1"/>
+          </a:fontRef>
+        </p:style>
+        <p:txBody>
+          <a:bodyPr rtlCol="0" anchor="ctr"/>
+          <a:lstStyle/>
+          <a:p>
+            <a:pPr algn="ctr"/>
+            <a:endParaRPr lang="en-US"/>
+          </a:p>
+        </p:txBody>
+      </p:sp>
+      <p:sp>
+        <p:nvSpPr>
+          <p:cNvPr id="42" name="Rectangle 41"/>
+          <p:cNvSpPr/>
+          <p:nvPr/>
+        </p:nvSpPr>
+        <p:spPr>
+          <a:xfrm>
+            <a:off x="4707868" y="2145437"/>
+            <a:ext cx="157516" cy="157522"/>
+          </a:xfrm>
+          <a:prstGeom prst="rect">
+            <a:avLst/>
+          </a:prstGeom>
+          <a:noFill/>
+          <a:ln>
+            <a:noFill/>
+          </a:ln>
+        </p:spPr>
+        <p:style>
+          <a:lnRef idx="1">
+            <a:schemeClr val="accent1"/>
+          </a:lnRef>
+          <a:fillRef idx="3">
+            <a:schemeClr val="accent1"/>
+          </a:fillRef>
+          <a:effectRef idx="2">
+            <a:schemeClr val="accent1"/>
+          </a:effectRef>
+          <a:fontRef idx="minor">
+            <a:schemeClr val="lt1"/>
+          </a:fontRef>
+        </p:style>
+        <p:txBody>
+          <a:bodyPr rtlCol="0" anchor="ctr"/>
+          <a:lstStyle/>
+          <a:p>
+            <a:pPr algn="ctr"/>
+            <a:endParaRPr lang="en-US"/>
+          </a:p>
+        </p:txBody>
+      </p:sp>
+      <p:cxnSp>
+        <p:nvCxnSpPr>
+          <p:cNvPr id="47" name="Elbow Connector 46"/>
+          <p:cNvCxnSpPr>
+            <a:stCxn id="30" idx="6"/>
+            <a:endCxn id="24" idx="6"/>
+          </p:cNvCxnSpPr>
+          <p:nvPr/>
+        </p:nvCxnSpPr>
+        <p:spPr>
+          <a:xfrm>
+            <a:off x="7285784" y="1512628"/>
+            <a:ext cx="665" cy="632960"/>
+          </a:xfrm>
+          <a:prstGeom prst="bentConnector3">
+            <a:avLst>
+              <a:gd name="adj1" fmla="val 16409925"/>
+            </a:avLst>
+          </a:prstGeom>
+          <a:ln w="57150" cmpd="sng">
+            <a:solidFill>
+              <a:srgbClr val="0000FF"/>
+            </a:solidFill>
+          </a:ln>
+        </p:spPr>
+        <p:style>
+          <a:lnRef idx="2">
+            <a:schemeClr val="accent1"/>
+          </a:lnRef>
+          <a:fillRef idx="0">
+            <a:schemeClr val="accent1"/>
+          </a:fillRef>
+          <a:effectRef idx="1">
+            <a:schemeClr val="accent1"/>
+          </a:effectRef>
+          <a:fontRef idx="minor">
+            <a:schemeClr val="tx1"/>
+          </a:fontRef>
+        </p:style>
+      </p:cxnSp>
+      <p:cxnSp>
+        <p:nvCxnSpPr>
+          <p:cNvPr id="50" name="Elbow Connector 49"/>
+          <p:cNvCxnSpPr>
+            <a:stCxn id="64" idx="2"/>
+            <a:endCxn id="28" idx="2"/>
+          </p:cNvCxnSpPr>
+          <p:nvPr/>
+        </p:nvCxnSpPr>
+        <p:spPr>
+          <a:xfrm rot="16200000" flipH="1">
+            <a:off x="4096893" y="-1323100"/>
+            <a:ext cx="925694" cy="5167735"/>
+          </a:xfrm>
+          <a:prstGeom prst="bentConnector2">
+            <a:avLst/>
+          </a:prstGeom>
+          <a:ln w="57150" cmpd="sng">
+            <a:solidFill>
+              <a:srgbClr val="33CC33"/>
+            </a:solidFill>
+          </a:ln>
+        </p:spPr>
+        <p:style>
+          <a:lnRef idx="2">
+            <a:schemeClr val="accent1"/>
+          </a:lnRef>
+          <a:fillRef idx="0">
+            <a:schemeClr val="accent1"/>
+          </a:fillRef>
+          <a:effectRef idx="1">
+            <a:schemeClr val="accent1"/>
+          </a:effectRef>
+          <a:fontRef idx="minor">
+            <a:schemeClr val="tx1"/>
+          </a:fontRef>
+        </p:style>
+      </p:cxnSp>
+      <p:cxnSp>
+        <p:nvCxnSpPr>
+          <p:cNvPr id="53" name="Elbow Connector 52"/>
+          <p:cNvCxnSpPr>
+            <a:stCxn id="68" idx="0"/>
+            <a:endCxn id="32" idx="2"/>
+          </p:cNvCxnSpPr>
+          <p:nvPr/>
+        </p:nvCxnSpPr>
+        <p:spPr>
+          <a:xfrm rot="5400000" flipH="1" flipV="1">
+            <a:off x="4050029" y="377388"/>
+            <a:ext cx="2170549" cy="4019059"/>
+          </a:xfrm>
+          <a:prstGeom prst="bentConnector2">
+            <a:avLst/>
+          </a:prstGeom>
+          <a:ln w="57150" cmpd="sng">
+            <a:solidFill>
+              <a:srgbClr val="FF0000"/>
+            </a:solidFill>
+          </a:ln>
+        </p:spPr>
+        <p:style>
+          <a:lnRef idx="2">
+            <a:schemeClr val="accent1"/>
+          </a:lnRef>
+          <a:fillRef idx="0">
+            <a:schemeClr val="accent1"/>
+          </a:fillRef>
+          <a:effectRef idx="1">
+            <a:schemeClr val="accent1"/>
+          </a:effectRef>
+          <a:fontRef idx="minor">
+            <a:schemeClr val="tx1"/>
+          </a:fontRef>
+        </p:style>
+      </p:cxnSp>
+      <p:cxnSp>
+        <p:nvCxnSpPr>
+          <p:cNvPr id="56" name="Elbow Connector 55"/>
+          <p:cNvCxnSpPr>
+            <a:stCxn id="69" idx="0"/>
+            <a:endCxn id="30" idx="2"/>
+          </p:cNvCxnSpPr>
+          <p:nvPr/>
+        </p:nvCxnSpPr>
+        <p:spPr>
+          <a:xfrm rot="5400000" flipH="1" flipV="1">
+            <a:off x="4292516" y="627007"/>
+            <a:ext cx="1966083" cy="3737326"/>
+          </a:xfrm>
+          <a:prstGeom prst="bentConnector2">
+            <a:avLst/>
+          </a:prstGeom>
+          <a:ln w="57150" cmpd="sng">
+            <a:solidFill>
+              <a:schemeClr val="tx1">
+                <a:lumMod val="95000"/>
+                <a:lumOff val="5000"/>
+              </a:schemeClr>
+            </a:solidFill>
+          </a:ln>
+        </p:spPr>
+        <p:style>
+          <a:lnRef idx="2">
+            <a:schemeClr val="accent1"/>
+          </a:lnRef>
+          <a:fillRef idx="0">
+            <a:schemeClr val="accent1"/>
+          </a:fillRef>
+          <a:effectRef idx="1">
+            <a:schemeClr val="accent1"/>
+          </a:effectRef>
+          <a:fontRef idx="minor">
+            <a:schemeClr val="tx1"/>
+          </a:fontRef>
+        </p:style>
+      </p:cxnSp>
+      <p:cxnSp>
+        <p:nvCxnSpPr>
+          <p:cNvPr id="59" name="Elbow Connector 58"/>
+          <p:cNvCxnSpPr>
+            <a:stCxn id="65" idx="2"/>
+            <a:endCxn id="26" idx="2"/>
+          </p:cNvCxnSpPr>
+          <p:nvPr/>
+        </p:nvCxnSpPr>
+        <p:spPr>
+          <a:xfrm rot="16200000" flipH="1">
+            <a:off x="4071805" y="-1139091"/>
+            <a:ext cx="1130160" cy="5017224"/>
+          </a:xfrm>
+          <a:prstGeom prst="bentConnector2">
+            <a:avLst/>
+          </a:prstGeom>
+          <a:ln w="57150" cmpd="sng">
+            <a:solidFill>
+              <a:srgbClr val="FFFF00"/>
+            </a:solidFill>
+          </a:ln>
+        </p:spPr>
+        <p:style>
+          <a:lnRef idx="2">
+            <a:schemeClr val="accent1"/>
+          </a:lnRef>
+          <a:fillRef idx="0">
+            <a:schemeClr val="accent1"/>
+          </a:fillRef>
+          <a:effectRef idx="1">
+            <a:schemeClr val="accent1"/>
+          </a:effectRef>
+          <a:fontRef idx="minor">
+            <a:schemeClr val="tx1"/>
+          </a:fontRef>
+        </p:style>
+      </p:cxnSp>
+      <p:sp>
+        <p:nvSpPr>
+          <p:cNvPr id="77" name="TextBox 76"/>
+          <p:cNvSpPr txBox="1"/>
+          <p:nvPr/>
+        </p:nvSpPr>
+        <p:spPr>
+          <a:xfrm rot="16200000">
+            <a:off x="3145548" y="3759506"/>
+            <a:ext cx="511741" cy="307777"/>
+          </a:xfrm>
+          <a:prstGeom prst="rect">
+            <a:avLst/>
+          </a:prstGeom>
+          <a:noFill/>
+        </p:spPr>
+        <p:txBody>
+          <a:bodyPr wrap="none" rtlCol="0">
+            <a:spAutoFit/>
+          </a:bodyPr>
+          <a:lstStyle/>
+          <a:p>
+            <a:r>
+              <a:rPr lang="en-US" sz="1400" dirty="0" smtClean="0">
+                <a:latin typeface="Arial Narrow"/>
+                <a:cs typeface="Arial Narrow"/>
+              </a:rPr>
+              <a:t>GND</a:t>
+            </a:r>
+            <a:endParaRPr lang="en-US" sz="1400" dirty="0">
+              <a:latin typeface="Arial Narrow"/>
+              <a:cs typeface="Arial Narrow"/>
+            </a:endParaRPr>
+          </a:p>
+        </p:txBody>
+      </p:sp>
+      <p:sp>
+        <p:nvSpPr>
+          <p:cNvPr id="80" name="TextBox 79"/>
+          <p:cNvSpPr txBox="1"/>
+          <p:nvPr/>
+        </p:nvSpPr>
+        <p:spPr>
+          <a:xfrm>
+            <a:off x="7856220" y="2092295"/>
+            <a:ext cx="692066" cy="307777"/>
+          </a:xfrm>
+          <a:prstGeom prst="rect">
+            <a:avLst/>
+          </a:prstGeom>
+          <a:noFill/>
+        </p:spPr>
+        <p:txBody>
+          <a:bodyPr wrap="none" rtlCol="0">
+            <a:spAutoFit/>
+          </a:bodyPr>
+          <a:lstStyle/>
+          <a:p>
+            <a:r>
+              <a:rPr lang="en-US" sz="1400" dirty="0" smtClean="0">
+                <a:solidFill>
+                  <a:schemeClr val="bg1">
+                    <a:lumMod val="95000"/>
+                  </a:schemeClr>
+                </a:solidFill>
+                <a:latin typeface="Arial Narrow"/>
+                <a:cs typeface="Arial Narrow"/>
+              </a:rPr>
+              <a:t>BMI160</a:t>
+            </a:r>
+            <a:endParaRPr lang="en-US" sz="1400" dirty="0">
+              <a:solidFill>
+                <a:schemeClr val="bg1">
+                  <a:lumMod val="95000"/>
+                </a:schemeClr>
+              </a:solidFill>
+              <a:latin typeface="Arial Narrow"/>
+              <a:cs typeface="Arial Narrow"/>
+            </a:endParaRPr>
+          </a:p>
+        </p:txBody>
+      </p:sp>
+      <p:sp>
+        <p:nvSpPr>
+          <p:cNvPr id="57" name="Oval 56"/>
+          <p:cNvSpPr/>
+          <p:nvPr/>
+        </p:nvSpPr>
+        <p:spPr>
+          <a:xfrm>
+            <a:off x="8705032" y="1238433"/>
+            <a:ext cx="141564" cy="155556"/>
+          </a:xfrm>
+          <a:prstGeom prst="ellipse">
+            <a:avLst/>
+          </a:prstGeom>
+          <a:solidFill>
+            <a:schemeClr val="bg1">
+              <a:lumMod val="75000"/>
+            </a:schemeClr>
+          </a:solidFill>
+          <a:ln>
+            <a:noFill/>
+          </a:ln>
+          <a:effectLst/>
+        </p:spPr>
+        <p:style>
+          <a:lnRef idx="1">
+            <a:schemeClr val="accent1"/>
+          </a:lnRef>
+          <a:fillRef idx="3">
+            <a:schemeClr val="accent1"/>
+          </a:fillRef>
+          <a:effectRef idx="2">
+            <a:schemeClr val="accent1"/>
+          </a:effectRef>
+          <a:fontRef idx="minor">
+            <a:schemeClr val="lt1"/>
+          </a:fontRef>
+        </p:style>
+        <p:txBody>
+          <a:bodyPr rtlCol="0" anchor="ctr"/>
+          <a:lstStyle/>
+          <a:p>
+            <a:pPr algn="ctr"/>
+            <a:endParaRPr lang="en-US" sz="1400">
+              <a:latin typeface="Arial Narrow"/>
+              <a:cs typeface="Arial Narrow"/>
+            </a:endParaRPr>
+          </a:p>
+        </p:txBody>
+      </p:sp>
+      <p:sp>
+        <p:nvSpPr>
+          <p:cNvPr id="58" name="Oval 57"/>
+          <p:cNvSpPr/>
+          <p:nvPr/>
+        </p:nvSpPr>
+        <p:spPr>
+          <a:xfrm>
+            <a:off x="8734426" y="1273913"/>
+            <a:ext cx="80262" cy="83064"/>
+          </a:xfrm>
+          <a:prstGeom prst="ellipse">
+            <a:avLst/>
+          </a:prstGeom>
+          <a:solidFill>
+            <a:schemeClr val="bg1"/>
+          </a:solidFill>
+          <a:ln>
+            <a:noFill/>
+          </a:ln>
+          <a:effectLst/>
+        </p:spPr>
+        <p:style>
+          <a:lnRef idx="1">
+            <a:schemeClr val="accent1"/>
+          </a:lnRef>
+          <a:fillRef idx="3">
+            <a:schemeClr val="accent1"/>
+          </a:fillRef>
+          <a:effectRef idx="2">
+            <a:schemeClr val="accent1"/>
+          </a:effectRef>
+          <a:fontRef idx="minor">
+            <a:schemeClr val="lt1"/>
+          </a:fontRef>
+        </p:style>
+        <p:txBody>
+          <a:bodyPr rtlCol="0" anchor="ctr"/>
+          <a:lstStyle/>
+          <a:p>
+            <a:pPr algn="ctr"/>
+            <a:endParaRPr lang="en-US" sz="1400">
+              <a:latin typeface="Arial Narrow"/>
+              <a:cs typeface="Arial Narrow"/>
+            </a:endParaRPr>
+          </a:p>
+        </p:txBody>
+      </p:sp>
+      <p:sp>
+        <p:nvSpPr>
+          <p:cNvPr id="60" name="TextBox 59"/>
+          <p:cNvSpPr txBox="1"/>
+          <p:nvPr/>
+        </p:nvSpPr>
+        <p:spPr>
+          <a:xfrm>
+            <a:off x="8190422" y="1162129"/>
+            <a:ext cx="503676" cy="307777"/>
+          </a:xfrm>
+          <a:prstGeom prst="rect">
+            <a:avLst/>
+          </a:prstGeom>
+          <a:noFill/>
+        </p:spPr>
+        <p:txBody>
+          <a:bodyPr wrap="none" rtlCol="0">
+            <a:spAutoFit/>
+          </a:bodyPr>
+          <a:lstStyle/>
+          <a:p>
+            <a:pPr algn="r"/>
+            <a:r>
+              <a:rPr lang="en-US" sz="1400" dirty="0" smtClean="0">
+                <a:solidFill>
+                  <a:schemeClr val="bg1">
+                    <a:lumMod val="95000"/>
+                  </a:schemeClr>
+                </a:solidFill>
+                <a:latin typeface="Arial Narrow"/>
+                <a:cs typeface="Arial Narrow"/>
+              </a:rPr>
+              <a:t>INT1</a:t>
+            </a:r>
+            <a:endParaRPr lang="en-US" sz="1400" dirty="0">
+              <a:solidFill>
+                <a:schemeClr val="bg1">
+                  <a:lumMod val="95000"/>
+                </a:schemeClr>
+              </a:solidFill>
+              <a:latin typeface="Arial Narrow"/>
+              <a:cs typeface="Arial Narrow"/>
+            </a:endParaRPr>
+          </a:p>
+        </p:txBody>
+      </p:sp>
+      <p:cxnSp>
+        <p:nvCxnSpPr>
+          <p:cNvPr id="61" name="Elbow Connector 60"/>
+          <p:cNvCxnSpPr>
+            <a:stCxn id="62" idx="2"/>
+            <a:endCxn id="57" idx="0"/>
+          </p:cNvCxnSpPr>
+          <p:nvPr/>
+        </p:nvCxnSpPr>
+        <p:spPr>
+          <a:xfrm rot="16200000" flipH="1">
+            <a:off x="6328141" y="-1209240"/>
+            <a:ext cx="455946" cy="4439399"/>
+          </a:xfrm>
+          <a:prstGeom prst="bentConnector3">
+            <a:avLst>
+              <a:gd name="adj1" fmla="val 50000"/>
+            </a:avLst>
+          </a:prstGeom>
+          <a:ln w="57150" cmpd="sng">
+            <a:solidFill>
+              <a:srgbClr val="00FFFF"/>
+            </a:solidFill>
+          </a:ln>
+        </p:spPr>
+        <p:style>
+          <a:lnRef idx="2">
+            <a:schemeClr val="accent1"/>
+          </a:lnRef>
+          <a:fillRef idx="0">
+            <a:schemeClr val="accent1"/>
+          </a:fillRef>
+          <a:effectRef idx="1">
+            <a:schemeClr val="accent1"/>
+          </a:effectRef>
+          <a:fontRef idx="minor">
+            <a:schemeClr val="tx1"/>
+          </a:fontRef>
+        </p:style>
+      </p:cxnSp>
+      <p:sp>
+        <p:nvSpPr>
+          <p:cNvPr id="62" name="Rectangle 61"/>
+          <p:cNvSpPr/>
+          <p:nvPr/>
+        </p:nvSpPr>
+        <p:spPr>
+          <a:xfrm>
+            <a:off x="4257657" y="624965"/>
+            <a:ext cx="157516" cy="157522"/>
+          </a:xfrm>
+          <a:prstGeom prst="rect">
+            <a:avLst/>
+          </a:prstGeom>
+          <a:noFill/>
+          <a:ln>
+            <a:noFill/>
+          </a:ln>
+        </p:spPr>
+        <p:style>
+          <a:lnRef idx="1">
+            <a:schemeClr val="accent1"/>
+          </a:lnRef>
+          <a:fillRef idx="3">
+            <a:schemeClr val="accent1"/>
+          </a:fillRef>
+          <a:effectRef idx="2">
+            <a:schemeClr val="accent1"/>
+          </a:effectRef>
+          <a:fontRef idx="minor">
+            <a:schemeClr val="lt1"/>
+          </a:fontRef>
+        </p:style>
+        <p:txBody>
+          <a:bodyPr rtlCol="0" anchor="ctr"/>
+          <a:lstStyle/>
+          <a:p>
+            <a:pPr algn="ctr"/>
+            <a:endParaRPr lang="en-US"/>
+          </a:p>
+        </p:txBody>
+      </p:sp>
+      <p:sp>
+        <p:nvSpPr>
+          <p:cNvPr id="63" name="TextBox 62"/>
+          <p:cNvSpPr txBox="1"/>
+          <p:nvPr/>
+        </p:nvSpPr>
+        <p:spPr>
+          <a:xfrm rot="16200000">
+            <a:off x="4213667" y="271674"/>
+            <a:ext cx="266544" cy="307777"/>
+          </a:xfrm>
+          <a:prstGeom prst="rect">
+            <a:avLst/>
+          </a:prstGeom>
+          <a:noFill/>
+        </p:spPr>
+        <p:txBody>
+          <a:bodyPr wrap="none" rtlCol="0">
+            <a:spAutoFit/>
+          </a:bodyPr>
+          <a:lstStyle/>
+          <a:p>
+            <a:r>
+              <a:rPr lang="en-US" sz="1400" dirty="0" smtClean="0">
+                <a:latin typeface="Arial Narrow"/>
+                <a:cs typeface="Arial Narrow"/>
+              </a:rPr>
+              <a:t>2</a:t>
+            </a:r>
+            <a:endParaRPr lang="en-US" sz="1400" dirty="0">
+              <a:latin typeface="Arial Narrow"/>
+              <a:cs typeface="Arial Narrow"/>
+            </a:endParaRPr>
+          </a:p>
+        </p:txBody>
+      </p:sp>
+      <p:sp>
+        <p:nvSpPr>
+          <p:cNvPr id="64" name="Rectangle 63"/>
+          <p:cNvSpPr/>
+          <p:nvPr/>
+        </p:nvSpPr>
+        <p:spPr>
+          <a:xfrm>
+            <a:off x="1897115" y="640399"/>
+            <a:ext cx="157516" cy="157522"/>
+          </a:xfrm>
+          <a:prstGeom prst="rect">
+            <a:avLst/>
+          </a:prstGeom>
+          <a:noFill/>
+          <a:ln>
+            <a:noFill/>
+          </a:ln>
+        </p:spPr>
+        <p:style>
+          <a:lnRef idx="1">
+            <a:schemeClr val="accent1"/>
+          </a:lnRef>
+          <a:fillRef idx="3">
+            <a:schemeClr val="accent1"/>
+          </a:fillRef>
+          <a:effectRef idx="2">
+            <a:schemeClr val="accent1"/>
+          </a:effectRef>
+          <a:fontRef idx="minor">
+            <a:schemeClr val="lt1"/>
+          </a:fontRef>
+        </p:style>
+        <p:txBody>
+          <a:bodyPr rtlCol="0" anchor="ctr"/>
+          <a:lstStyle/>
+          <a:p>
+            <a:pPr algn="ctr"/>
+            <a:endParaRPr lang="en-US"/>
+          </a:p>
+        </p:txBody>
+      </p:sp>
+      <p:sp>
+        <p:nvSpPr>
+          <p:cNvPr id="65" name="Rectangle 64"/>
+          <p:cNvSpPr/>
+          <p:nvPr/>
+        </p:nvSpPr>
+        <p:spPr>
+          <a:xfrm>
+            <a:off x="2049515" y="646919"/>
+            <a:ext cx="157516" cy="157522"/>
+          </a:xfrm>
+          <a:prstGeom prst="rect">
+            <a:avLst/>
+          </a:prstGeom>
+          <a:noFill/>
+          <a:ln>
+            <a:noFill/>
+          </a:ln>
+        </p:spPr>
+        <p:style>
+          <a:lnRef idx="1">
+            <a:schemeClr val="accent1"/>
+          </a:lnRef>
+          <a:fillRef idx="3">
+            <a:schemeClr val="accent1"/>
+          </a:fillRef>
+          <a:effectRef idx="2">
+            <a:schemeClr val="accent1"/>
+          </a:effectRef>
+          <a:fontRef idx="minor">
+            <a:schemeClr val="lt1"/>
+          </a:fontRef>
+        </p:style>
+        <p:txBody>
+          <a:bodyPr rtlCol="0" anchor="ctr"/>
+          <a:lstStyle/>
+          <a:p>
+            <a:pPr algn="ctr"/>
+            <a:endParaRPr lang="en-US"/>
+          </a:p>
+        </p:txBody>
+      </p:sp>
+      <p:sp>
+        <p:nvSpPr>
+          <p:cNvPr id="68" name="Rectangle 67"/>
+          <p:cNvSpPr/>
+          <p:nvPr/>
+        </p:nvSpPr>
+        <p:spPr>
+          <a:xfrm>
+            <a:off x="3047016" y="3472191"/>
+            <a:ext cx="157516" cy="157522"/>
+          </a:xfrm>
+          <a:prstGeom prst="rect">
+            <a:avLst/>
+          </a:prstGeom>
+          <a:noFill/>
+          <a:ln>
+            <a:noFill/>
+          </a:ln>
+        </p:spPr>
+        <p:style>
+          <a:lnRef idx="1">
+            <a:schemeClr val="accent1"/>
+          </a:lnRef>
+          <a:fillRef idx="3">
+            <a:schemeClr val="accent1"/>
+          </a:fillRef>
+          <a:effectRef idx="2">
+            <a:schemeClr val="accent1"/>
+          </a:effectRef>
+          <a:fontRef idx="minor">
+            <a:schemeClr val="lt1"/>
+          </a:fontRef>
+        </p:style>
+        <p:txBody>
+          <a:bodyPr rtlCol="0" anchor="ctr"/>
+          <a:lstStyle/>
+          <a:p>
+            <a:pPr algn="ctr"/>
+            <a:endParaRPr lang="en-US"/>
+          </a:p>
+        </p:txBody>
+      </p:sp>
+      <p:sp>
+        <p:nvSpPr>
+          <p:cNvPr id="69" name="Rectangle 68"/>
+          <p:cNvSpPr/>
+          <p:nvPr/>
+        </p:nvSpPr>
+        <p:spPr>
+          <a:xfrm>
+            <a:off x="3328136" y="3478711"/>
+            <a:ext cx="157516" cy="157522"/>
+          </a:xfrm>
+          <a:prstGeom prst="rect">
+            <a:avLst/>
+          </a:prstGeom>
+          <a:noFill/>
+          <a:ln>
+            <a:noFill/>
+          </a:ln>
+        </p:spPr>
+        <p:style>
+          <a:lnRef idx="1">
+            <a:schemeClr val="accent1"/>
+          </a:lnRef>
+          <a:fillRef idx="3">
+            <a:schemeClr val="accent1"/>
+          </a:fillRef>
+          <a:effectRef idx="2">
+            <a:schemeClr val="accent1"/>
+          </a:effectRef>
+          <a:fontRef idx="minor">
+            <a:schemeClr val="lt1"/>
+          </a:fontRef>
+        </p:style>
+        <p:txBody>
+          <a:bodyPr rtlCol="0" anchor="ctr"/>
+          <a:lstStyle/>
+          <a:p>
+            <a:pPr algn="ctr"/>
+            <a:endParaRPr lang="en-US"/>
+          </a:p>
+        </p:txBody>
+      </p:sp>
+      <p:sp>
+        <p:nvSpPr>
+          <p:cNvPr id="72" name="TextBox 71"/>
+          <p:cNvSpPr txBox="1"/>
+          <p:nvPr/>
+        </p:nvSpPr>
+        <p:spPr>
+          <a:xfrm rot="16200000">
+            <a:off x="2942387" y="3791770"/>
+            <a:ext cx="364728" cy="307777"/>
+          </a:xfrm>
+          <a:prstGeom prst="rect">
+            <a:avLst/>
+          </a:prstGeom>
+          <a:noFill/>
+        </p:spPr>
+        <p:txBody>
+          <a:bodyPr wrap="none" rtlCol="0">
+            <a:spAutoFit/>
+          </a:bodyPr>
+          <a:lstStyle/>
+          <a:p>
+            <a:r>
+              <a:rPr lang="en-US" sz="1400" dirty="0" smtClean="0">
+                <a:latin typeface="Arial Narrow"/>
+                <a:cs typeface="Arial Narrow"/>
+              </a:rPr>
+              <a:t>5V</a:t>
+            </a:r>
+            <a:endParaRPr lang="en-US" sz="1400" dirty="0">
+              <a:latin typeface="Arial Narrow"/>
+              <a:cs typeface="Arial Narrow"/>
+            </a:endParaRPr>
+          </a:p>
+        </p:txBody>
+      </p:sp>
+      <p:sp>
+        <p:nvSpPr>
+          <p:cNvPr id="73" name="TextBox 72"/>
+          <p:cNvSpPr txBox="1"/>
+          <p:nvPr/>
+        </p:nvSpPr>
+        <p:spPr>
+          <a:xfrm rot="16200000">
+            <a:off x="1724290" y="187670"/>
+            <a:ext cx="466794" cy="307777"/>
+          </a:xfrm>
+          <a:prstGeom prst="rect">
+            <a:avLst/>
+          </a:prstGeom>
+          <a:noFill/>
+        </p:spPr>
+        <p:txBody>
+          <a:bodyPr wrap="none" rtlCol="0">
+            <a:spAutoFit/>
+          </a:bodyPr>
+          <a:lstStyle/>
+          <a:p>
+            <a:r>
+              <a:rPr lang="en-US" sz="1400" dirty="0" smtClean="0">
+                <a:latin typeface="Arial Narrow"/>
+                <a:cs typeface="Arial Narrow"/>
+              </a:rPr>
+              <a:t>SCL</a:t>
+            </a:r>
+            <a:endParaRPr lang="en-US" sz="1400" dirty="0">
+              <a:latin typeface="Arial Narrow"/>
+              <a:cs typeface="Arial Narrow"/>
+            </a:endParaRPr>
+          </a:p>
+        </p:txBody>
+      </p:sp>
+      <p:sp>
+        <p:nvSpPr>
+          <p:cNvPr id="81" name="TextBox 80"/>
+          <p:cNvSpPr txBox="1"/>
+          <p:nvPr/>
+        </p:nvSpPr>
+        <p:spPr>
+          <a:xfrm rot="16200000">
+            <a:off x="1878860" y="185609"/>
+            <a:ext cx="479618" cy="307777"/>
+          </a:xfrm>
+          <a:prstGeom prst="rect">
+            <a:avLst/>
+          </a:prstGeom>
+          <a:noFill/>
+        </p:spPr>
+        <p:txBody>
+          <a:bodyPr wrap="none" rtlCol="0">
+            <a:spAutoFit/>
+          </a:bodyPr>
+          <a:lstStyle/>
+          <a:p>
+            <a:r>
+              <a:rPr lang="en-US" sz="1400" dirty="0" smtClean="0">
+                <a:latin typeface="Arial Narrow"/>
+                <a:cs typeface="Arial Narrow"/>
+              </a:rPr>
+              <a:t>SDA</a:t>
+            </a:r>
+            <a:endParaRPr lang="en-US" sz="1400" dirty="0">
+              <a:latin typeface="Arial Narrow"/>
+              <a:cs typeface="Arial Narrow"/>
+            </a:endParaRPr>
+          </a:p>
+        </p:txBody>
+      </p:sp>
+    </p:spTree>
+    <p:extLst>
+      <p:ext uri="{BB962C8B-B14F-4D97-AF65-F5344CB8AC3E}">
+        <p14:creationId xmlns:p14="http://schemas.microsoft.com/office/powerpoint/2010/main" val="1746857384"/>
+      </p:ext>
+    </p:extLst>
+  </p:cSld>
+  <p:clrMapOvr>
+    <a:masterClrMapping/>
+  </p:clrMapOvr>
+  <p:timing>
+    <p:tnLst>
+      <p:par>
+        <p:cTn xmlns:p14="http://schemas.microsoft.com/office/powerpoint/2010/main" id="1" dur="indefinite" restart="never" nodeType="tmRoot"/>
+      </p:par>
+    </p:tnLst>
+  </p:timing>
+</p:sld>
+</file>
+
+<file path=ppt/slides/slide3.xml><?xml version="1.0" encoding="utf-8"?>
+<p:sld xmlns:a="http://schemas.openxmlformats.org/drawingml/2006/main" xmlns:r="http://schemas.openxmlformats.org/officeDocument/2006/relationships" xmlns:p="http://schemas.openxmlformats.org/presentationml/2006/main">
+  <p:cSld>
+    <p:spTree>
+      <p:nvGrpSpPr>
+        <p:cNvPr id="1" name=""/>
+        <p:cNvGrpSpPr/>
+        <p:nvPr/>
+      </p:nvGrpSpPr>
+      <p:grpSpPr>
+        <a:xfrm>
+          <a:off x="0" y="0"/>
+          <a:ext cx="0" cy="0"/>
+          <a:chOff x="0" y="0"/>
+          <a:chExt cx="0" cy="0"/>
+        </a:xfrm>
+      </p:grpSpPr>
+      <p:sp>
+        <p:nvSpPr>
+          <p:cNvPr id="2" name="Date Placeholder 1"/>
+          <p:cNvSpPr>
+            <a:spLocks noGrp="1"/>
+          </p:cNvSpPr>
+          <p:nvPr>
+            <p:ph type="dt" sz="half" idx="10"/>
+          </p:nvPr>
+        </p:nvSpPr>
+        <p:spPr/>
+        <p:txBody>
+          <a:bodyPr/>
+          <a:lstStyle/>
+          <a:p>
+            <a:fld id="{BE3AE64F-59D5-1541-93FB-F8431E953C54}" type="datetimeFigureOut">
+              <a:rPr lang="en-US" smtClean="0"/>
+              <a:t>17/05/01</a:t>
+            </a:fld>
+            <a:endParaRPr lang="en-US"/>
+          </a:p>
+        </p:txBody>
+      </p:sp>
+      <p:sp>
+        <p:nvSpPr>
+          <p:cNvPr id="3" name="Footer Placeholder 2"/>
+          <p:cNvSpPr>
+            <a:spLocks noGrp="1"/>
+          </p:cNvSpPr>
+          <p:nvPr>
+            <p:ph type="ftr" sz="quarter" idx="11"/>
+          </p:nvPr>
+        </p:nvSpPr>
+        <p:spPr/>
+        <p:txBody>
+          <a:bodyPr/>
+          <a:lstStyle/>
+          <a:p>
+            <a:endParaRPr lang="en-US"/>
+          </a:p>
+        </p:txBody>
+      </p:sp>
+      <p:sp>
+        <p:nvSpPr>
+          <p:cNvPr id="4" name="Slide Number Placeholder 3"/>
+          <p:cNvSpPr>
+            <a:spLocks noGrp="1"/>
+          </p:cNvSpPr>
+          <p:nvPr>
+            <p:ph type="sldNum" sz="quarter" idx="12"/>
+          </p:nvPr>
+        </p:nvSpPr>
+        <p:spPr/>
+        <p:txBody>
+          <a:bodyPr/>
+          <a:lstStyle/>
+          <a:p>
+            <a:fld id="{2875A458-CA75-724E-8507-CF6DE86A334B}" type="slidenum">
+              <a:rPr lang="en-US" smtClean="0"/>
+              <a:t>3</a:t>
+            </a:fld>
+            <a:endParaRPr lang="en-US"/>
+          </a:p>
+        </p:txBody>
+      </p:sp>
+      <p:pic>
+        <p:nvPicPr>
+          <p:cNvPr id="5" name="Picture 4" descr="IMG_2209.JPG"/>
+          <p:cNvPicPr>
+            <a:picLocks noChangeAspect="1"/>
+          </p:cNvPicPr>
+          <p:nvPr/>
+        </p:nvPicPr>
+        <p:blipFill>
+          <a:blip r:embed="rId2" cstate="print">
+            <a:extLst>
+              <a:ext uri="{28A0092B-C50C-407E-A947-70E740481C1C}">
+                <a14:useLocalDpi xmlns:a14="http://schemas.microsoft.com/office/drawing/2010/main" val="0"/>
+              </a:ext>
+            </a:extLst>
+          </a:blip>
+          <a:stretch>
+            <a:fillRect/>
+          </a:stretch>
+        </p:blipFill>
+        <p:spPr>
+          <a:xfrm>
+            <a:off x="5235062" y="1372990"/>
+            <a:ext cx="1544408" cy="2165678"/>
+          </a:xfrm>
+          <a:prstGeom prst="rect">
+            <a:avLst/>
+          </a:prstGeom>
+        </p:spPr>
+      </p:pic>
+      <p:pic>
+        <p:nvPicPr>
+          <p:cNvPr id="6" name="Picture 5" descr="IMG_2210.JPG"/>
+          <p:cNvPicPr>
+            <a:picLocks noChangeAspect="1"/>
+          </p:cNvPicPr>
+          <p:nvPr/>
+        </p:nvPicPr>
+        <p:blipFill>
+          <a:blip r:embed="rId3">
+            <a:extLst>
+              <a:ext uri="{28A0092B-C50C-407E-A947-70E740481C1C}">
+                <a14:useLocalDpi xmlns:a14="http://schemas.microsoft.com/office/drawing/2010/main" val="0"/>
+              </a:ext>
+            </a:extLst>
+          </a:blip>
+          <a:stretch>
+            <a:fillRect/>
+          </a:stretch>
+        </p:blipFill>
+        <p:spPr>
+          <a:xfrm>
+            <a:off x="8864540" y="1612966"/>
+            <a:ext cx="2823264" cy="1835693"/>
+          </a:xfrm>
+          <a:prstGeom prst="rect">
+            <a:avLst/>
+          </a:prstGeom>
+        </p:spPr>
+      </p:pic>
+      <p:cxnSp>
+        <p:nvCxnSpPr>
+          <p:cNvPr id="11" name="Elbow Connector 10"/>
+          <p:cNvCxnSpPr>
+            <a:endCxn id="5" idx="1"/>
+          </p:cNvCxnSpPr>
+          <p:nvPr/>
+        </p:nvCxnSpPr>
+        <p:spPr>
+          <a:xfrm rot="10800000">
+            <a:off x="5235062" y="2455829"/>
+            <a:ext cx="2084832" cy="1216920"/>
+          </a:xfrm>
+          <a:prstGeom prst="bentConnector3">
+            <a:avLst>
+              <a:gd name="adj1" fmla="val 110965"/>
+            </a:avLst>
+          </a:prstGeom>
+          <a:ln w="57150" cmpd="sng">
+            <a:solidFill>
+              <a:srgbClr val="00FFFF"/>
+            </a:solidFill>
+          </a:ln>
+        </p:spPr>
+        <p:style>
+          <a:lnRef idx="2">
+            <a:schemeClr val="accent1"/>
+          </a:lnRef>
+          <a:fillRef idx="0">
+            <a:schemeClr val="accent1"/>
+          </a:fillRef>
+          <a:effectRef idx="1">
+            <a:schemeClr val="accent1"/>
+          </a:effectRef>
+          <a:fontRef idx="minor">
+            <a:schemeClr val="tx1"/>
+          </a:fontRef>
+        </p:style>
+      </p:cxnSp>
+      <p:cxnSp>
+        <p:nvCxnSpPr>
+          <p:cNvPr id="25" name="Straight Connector 24"/>
+          <p:cNvCxnSpPr/>
+          <p:nvPr/>
+        </p:nvCxnSpPr>
+        <p:spPr>
+          <a:xfrm>
+            <a:off x="6625120" y="1576878"/>
+            <a:ext cx="692423" cy="2061"/>
+          </a:xfrm>
+          <a:prstGeom prst="line">
+            <a:avLst/>
+          </a:prstGeom>
+          <a:ln w="57150" cmpd="sng">
+            <a:solidFill>
+              <a:srgbClr val="FF0000"/>
+            </a:solidFill>
+          </a:ln>
+        </p:spPr>
+        <p:style>
+          <a:lnRef idx="2">
+            <a:schemeClr val="accent1"/>
+          </a:lnRef>
+          <a:fillRef idx="0">
+            <a:schemeClr val="accent1"/>
+          </a:fillRef>
+          <a:effectRef idx="1">
+            <a:schemeClr val="accent1"/>
+          </a:effectRef>
+          <a:fontRef idx="minor">
+            <a:schemeClr val="tx1"/>
+          </a:fontRef>
+        </p:style>
+      </p:cxnSp>
+      <p:cxnSp>
+        <p:nvCxnSpPr>
+          <p:cNvPr id="27" name="Straight Connector 26"/>
+          <p:cNvCxnSpPr/>
+          <p:nvPr/>
+        </p:nvCxnSpPr>
+        <p:spPr>
+          <a:xfrm>
+            <a:off x="6623056" y="2166912"/>
+            <a:ext cx="692423" cy="2061"/>
+          </a:xfrm>
+          <a:prstGeom prst="line">
+            <a:avLst/>
+          </a:prstGeom>
+          <a:ln w="57150" cmpd="sng">
+            <a:solidFill>
+              <a:schemeClr val="tx1"/>
+            </a:solidFill>
+          </a:ln>
+        </p:spPr>
+        <p:style>
+          <a:lnRef idx="2">
+            <a:schemeClr val="accent1"/>
+          </a:lnRef>
+          <a:fillRef idx="0">
+            <a:schemeClr val="accent1"/>
+          </a:fillRef>
+          <a:effectRef idx="1">
+            <a:schemeClr val="accent1"/>
+          </a:effectRef>
+          <a:fontRef idx="minor">
+            <a:schemeClr val="tx1"/>
+          </a:fontRef>
+        </p:style>
+      </p:cxnSp>
+      <p:cxnSp>
+        <p:nvCxnSpPr>
+          <p:cNvPr id="28" name="Straight Connector 27"/>
+          <p:cNvCxnSpPr/>
+          <p:nvPr/>
+        </p:nvCxnSpPr>
+        <p:spPr>
+          <a:xfrm>
+            <a:off x="6620999" y="2456608"/>
+            <a:ext cx="692423" cy="2061"/>
+          </a:xfrm>
+          <a:prstGeom prst="line">
+            <a:avLst/>
+          </a:prstGeom>
+          <a:ln w="57150" cmpd="sng">
+            <a:solidFill>
+              <a:srgbClr val="33CC33"/>
+            </a:solidFill>
+          </a:ln>
+        </p:spPr>
+        <p:style>
+          <a:lnRef idx="2">
+            <a:schemeClr val="accent1"/>
+          </a:lnRef>
+          <a:fillRef idx="0">
+            <a:schemeClr val="accent1"/>
+          </a:fillRef>
+          <a:effectRef idx="1">
+            <a:schemeClr val="accent1"/>
+          </a:effectRef>
+          <a:fontRef idx="minor">
+            <a:schemeClr val="tx1"/>
+          </a:fontRef>
+        </p:style>
+      </p:cxnSp>
+      <p:cxnSp>
+        <p:nvCxnSpPr>
+          <p:cNvPr id="29" name="Straight Connector 28"/>
+          <p:cNvCxnSpPr/>
+          <p:nvPr/>
+        </p:nvCxnSpPr>
+        <p:spPr>
+          <a:xfrm>
+            <a:off x="6627515" y="2772051"/>
+            <a:ext cx="692423" cy="2061"/>
+          </a:xfrm>
+          <a:prstGeom prst="line">
+            <a:avLst/>
+          </a:prstGeom>
+          <a:ln w="57150" cmpd="sng">
+            <a:solidFill>
+              <a:srgbClr val="FFFF00"/>
+            </a:solidFill>
+          </a:ln>
+        </p:spPr>
+        <p:style>
+          <a:lnRef idx="2">
+            <a:schemeClr val="accent1"/>
+          </a:lnRef>
+          <a:fillRef idx="0">
+            <a:schemeClr val="accent1"/>
+          </a:fillRef>
+          <a:effectRef idx="1">
+            <a:schemeClr val="accent1"/>
+          </a:effectRef>
+          <a:fontRef idx="minor">
+            <a:schemeClr val="tx1"/>
+          </a:fontRef>
+        </p:style>
+      </p:cxnSp>
+      <p:cxnSp>
+        <p:nvCxnSpPr>
+          <p:cNvPr id="30" name="Straight Connector 29"/>
+          <p:cNvCxnSpPr/>
+          <p:nvPr/>
+        </p:nvCxnSpPr>
+        <p:spPr>
+          <a:xfrm>
+            <a:off x="6627516" y="3089555"/>
+            <a:ext cx="692423" cy="2061"/>
+          </a:xfrm>
+          <a:prstGeom prst="line">
+            <a:avLst/>
+          </a:prstGeom>
+          <a:ln w="57150" cmpd="sng">
+            <a:solidFill>
+              <a:schemeClr val="bg1">
+                <a:lumMod val="75000"/>
+              </a:schemeClr>
+            </a:solidFill>
+          </a:ln>
+        </p:spPr>
+        <p:style>
+          <a:lnRef idx="2">
+            <a:schemeClr val="accent1"/>
+          </a:lnRef>
+          <a:fillRef idx="0">
+            <a:schemeClr val="accent1"/>
+          </a:fillRef>
+          <a:effectRef idx="1">
+            <a:schemeClr val="accent1"/>
+          </a:effectRef>
+          <a:fontRef idx="minor">
+            <a:schemeClr val="tx1"/>
+          </a:fontRef>
+        </p:style>
+      </p:cxnSp>
+      <p:cxnSp>
+        <p:nvCxnSpPr>
+          <p:cNvPr id="31" name="Straight Connector 30"/>
+          <p:cNvCxnSpPr/>
+          <p:nvPr/>
+        </p:nvCxnSpPr>
+        <p:spPr>
+          <a:xfrm>
+            <a:off x="6634032" y="3404998"/>
+            <a:ext cx="692423" cy="2061"/>
+          </a:xfrm>
+          <a:prstGeom prst="line">
+            <a:avLst/>
+          </a:prstGeom>
+          <a:ln w="57150" cmpd="sng">
+            <a:solidFill>
+              <a:srgbClr val="0000FF"/>
+            </a:solidFill>
+          </a:ln>
+        </p:spPr>
+        <p:style>
+          <a:lnRef idx="2">
+            <a:schemeClr val="accent1"/>
+          </a:lnRef>
+          <a:fillRef idx="0">
+            <a:schemeClr val="accent1"/>
+          </a:fillRef>
+          <a:effectRef idx="1">
+            <a:schemeClr val="accent1"/>
+          </a:effectRef>
+          <a:fontRef idx="minor">
+            <a:schemeClr val="tx1"/>
+          </a:fontRef>
+        </p:style>
+      </p:cxnSp>
+      <p:cxnSp>
+        <p:nvCxnSpPr>
+          <p:cNvPr id="33" name="Straight Connector 32"/>
+          <p:cNvCxnSpPr/>
+          <p:nvPr/>
+        </p:nvCxnSpPr>
+        <p:spPr>
+          <a:xfrm>
+            <a:off x="8311503" y="1744372"/>
+            <a:ext cx="692423" cy="2061"/>
+          </a:xfrm>
+          <a:prstGeom prst="line">
+            <a:avLst/>
+          </a:prstGeom>
+          <a:ln w="57150" cmpd="sng">
+            <a:solidFill>
+              <a:srgbClr val="FF0000"/>
+            </a:solidFill>
+          </a:ln>
+        </p:spPr>
+        <p:style>
+          <a:lnRef idx="2">
+            <a:schemeClr val="accent1"/>
+          </a:lnRef>
+          <a:fillRef idx="0">
+            <a:schemeClr val="accent1"/>
+          </a:fillRef>
+          <a:effectRef idx="1">
+            <a:schemeClr val="accent1"/>
+          </a:effectRef>
+          <a:fontRef idx="minor">
+            <a:schemeClr val="tx1"/>
+          </a:fontRef>
+        </p:style>
+      </p:cxnSp>
+      <p:cxnSp>
+        <p:nvCxnSpPr>
+          <p:cNvPr id="34" name="Straight Connector 33"/>
+          <p:cNvCxnSpPr/>
+          <p:nvPr/>
+        </p:nvCxnSpPr>
+        <p:spPr>
+          <a:xfrm>
+            <a:off x="8309446" y="2034068"/>
+            <a:ext cx="692423" cy="2061"/>
+          </a:xfrm>
+          <a:prstGeom prst="line">
+            <a:avLst/>
+          </a:prstGeom>
+          <a:ln w="57150" cmpd="sng">
+            <a:solidFill>
+              <a:schemeClr val="tx1"/>
+            </a:solidFill>
+          </a:ln>
+        </p:spPr>
+        <p:style>
+          <a:lnRef idx="2">
+            <a:schemeClr val="accent1"/>
+          </a:lnRef>
+          <a:fillRef idx="0">
+            <a:schemeClr val="accent1"/>
+          </a:fillRef>
+          <a:effectRef idx="1">
+            <a:schemeClr val="accent1"/>
+          </a:effectRef>
+          <a:fontRef idx="minor">
+            <a:schemeClr val="tx1"/>
+          </a:fontRef>
+        </p:style>
+      </p:cxnSp>
+      <p:cxnSp>
+        <p:nvCxnSpPr>
+          <p:cNvPr id="35" name="Straight Connector 34"/>
+          <p:cNvCxnSpPr/>
+          <p:nvPr/>
+        </p:nvCxnSpPr>
+        <p:spPr>
+          <a:xfrm>
+            <a:off x="8315962" y="2349511"/>
+            <a:ext cx="692423" cy="2061"/>
+          </a:xfrm>
+          <a:prstGeom prst="line">
+            <a:avLst/>
+          </a:prstGeom>
+          <a:ln w="57150" cmpd="sng">
+            <a:solidFill>
+              <a:srgbClr val="33CC33"/>
+            </a:solidFill>
+          </a:ln>
+        </p:spPr>
+        <p:style>
+          <a:lnRef idx="2">
+            <a:schemeClr val="accent1"/>
+          </a:lnRef>
+          <a:fillRef idx="0">
+            <a:schemeClr val="accent1"/>
+          </a:fillRef>
+          <a:effectRef idx="1">
+            <a:schemeClr val="accent1"/>
+          </a:effectRef>
+          <a:fontRef idx="minor">
+            <a:schemeClr val="tx1"/>
+          </a:fontRef>
+        </p:style>
+      </p:cxnSp>
+      <p:cxnSp>
+        <p:nvCxnSpPr>
+          <p:cNvPr id="36" name="Straight Connector 35"/>
+          <p:cNvCxnSpPr/>
+          <p:nvPr/>
+        </p:nvCxnSpPr>
+        <p:spPr>
+          <a:xfrm>
+            <a:off x="8315963" y="2667015"/>
+            <a:ext cx="692423" cy="2061"/>
+          </a:xfrm>
+          <a:prstGeom prst="line">
+            <a:avLst/>
+          </a:prstGeom>
+          <a:ln w="57150" cmpd="sng">
+            <a:solidFill>
+              <a:srgbClr val="FFFF00"/>
+            </a:solidFill>
+          </a:ln>
+        </p:spPr>
+        <p:style>
+          <a:lnRef idx="2">
+            <a:schemeClr val="accent1"/>
+          </a:lnRef>
+          <a:fillRef idx="0">
+            <a:schemeClr val="accent1"/>
+          </a:fillRef>
+          <a:effectRef idx="1">
+            <a:schemeClr val="accent1"/>
+          </a:effectRef>
+          <a:fontRef idx="minor">
+            <a:schemeClr val="tx1"/>
+          </a:fontRef>
+        </p:style>
+      </p:cxnSp>
+      <p:cxnSp>
+        <p:nvCxnSpPr>
+          <p:cNvPr id="37" name="Straight Connector 36"/>
+          <p:cNvCxnSpPr/>
+          <p:nvPr/>
+        </p:nvCxnSpPr>
+        <p:spPr>
+          <a:xfrm>
+            <a:off x="8322479" y="2982458"/>
+            <a:ext cx="692423" cy="2061"/>
+          </a:xfrm>
+          <a:prstGeom prst="line">
+            <a:avLst/>
+          </a:prstGeom>
+          <a:ln w="57150" cmpd="sng">
+            <a:solidFill>
+              <a:srgbClr val="0000FF"/>
+            </a:solidFill>
+          </a:ln>
+        </p:spPr>
+        <p:style>
+          <a:lnRef idx="2">
+            <a:schemeClr val="accent1"/>
+          </a:lnRef>
+          <a:fillRef idx="0">
+            <a:schemeClr val="accent1"/>
+          </a:fillRef>
+          <a:effectRef idx="1">
+            <a:schemeClr val="accent1"/>
+          </a:effectRef>
+          <a:fontRef idx="minor">
+            <a:schemeClr val="tx1"/>
+          </a:fontRef>
+        </p:style>
+      </p:cxnSp>
+      <p:cxnSp>
+        <p:nvCxnSpPr>
+          <p:cNvPr id="38" name="Straight Connector 37"/>
+          <p:cNvCxnSpPr/>
+          <p:nvPr/>
+        </p:nvCxnSpPr>
+        <p:spPr>
+          <a:xfrm>
+            <a:off x="8320415" y="3332225"/>
+            <a:ext cx="692423" cy="2061"/>
+          </a:xfrm>
+          <a:prstGeom prst="line">
+            <a:avLst/>
+          </a:prstGeom>
+          <a:ln w="57150" cmpd="sng">
+            <a:solidFill>
+              <a:schemeClr val="bg1">
+                <a:lumMod val="75000"/>
+              </a:schemeClr>
+            </a:solidFill>
+          </a:ln>
+        </p:spPr>
+        <p:style>
+          <a:lnRef idx="2">
+            <a:schemeClr val="accent1"/>
+          </a:lnRef>
+          <a:fillRef idx="0">
+            <a:schemeClr val="accent1"/>
+          </a:fillRef>
+          <a:effectRef idx="1">
+            <a:schemeClr val="accent1"/>
+          </a:effectRef>
+          <a:fontRef idx="minor">
+            <a:schemeClr val="tx1"/>
+          </a:fontRef>
+        </p:style>
+      </p:cxnSp>
+      <p:cxnSp>
+        <p:nvCxnSpPr>
+          <p:cNvPr id="39" name="Elbow Connector 38"/>
+          <p:cNvCxnSpPr/>
+          <p:nvPr/>
+        </p:nvCxnSpPr>
+        <p:spPr>
+          <a:xfrm flipV="1">
+            <a:off x="8315331" y="3020580"/>
+            <a:ext cx="3260915" cy="652169"/>
+          </a:xfrm>
+          <a:prstGeom prst="bentConnector3">
+            <a:avLst>
+              <a:gd name="adj1" fmla="val 107010"/>
+            </a:avLst>
+          </a:prstGeom>
+          <a:ln w="57150" cmpd="sng">
+            <a:solidFill>
+              <a:srgbClr val="00FFFF"/>
+            </a:solidFill>
+          </a:ln>
+        </p:spPr>
+        <p:style>
+          <a:lnRef idx="2">
+            <a:schemeClr val="accent1"/>
+          </a:lnRef>
+          <a:fillRef idx="0">
+            <a:schemeClr val="accent1"/>
+          </a:fillRef>
+          <a:effectRef idx="1">
+            <a:schemeClr val="accent1"/>
+          </a:effectRef>
+          <a:fontRef idx="minor">
+            <a:schemeClr val="tx1"/>
+          </a:fontRef>
+        </p:style>
+      </p:cxnSp>
+      <p:pic>
+        <p:nvPicPr>
+          <p:cNvPr id="55" name="Picture 54" descr="BMI160-Module-350x350.jpg"/>
+          <p:cNvPicPr>
+            <a:picLocks noChangeAspect="1"/>
+          </p:cNvPicPr>
+          <p:nvPr/>
+        </p:nvPicPr>
+        <p:blipFill rotWithShape="1">
+          <a:blip r:embed="rId4">
+            <a:extLst>
+              <a:ext uri="{28A0092B-C50C-407E-A947-70E740481C1C}">
+                <a14:useLocalDpi xmlns:a14="http://schemas.microsoft.com/office/drawing/2010/main" val="0"/>
+              </a:ext>
+            </a:extLst>
+          </a:blip>
+          <a:srcRect l="12635" t="19582" r="7673" b="15470"/>
+          <a:stretch/>
+        </p:blipFill>
+        <p:spPr>
+          <a:xfrm>
+            <a:off x="7929171" y="102973"/>
+            <a:ext cx="1716272" cy="1398735"/>
+          </a:xfrm>
+          <a:prstGeom prst="rect">
+            <a:avLst/>
+          </a:prstGeom>
+        </p:spPr>
+      </p:pic>
+      <p:pic>
+        <p:nvPicPr>
+          <p:cNvPr id="56" name="Picture 55" descr="gy-bmi160-module-6dof-6-axis-rate-gyroscope-gravity-sensor-iic-spi.jpg"/>
+          <p:cNvPicPr>
+            <a:picLocks noChangeAspect="1"/>
+          </p:cNvPicPr>
+          <p:nvPr/>
+        </p:nvPicPr>
+        <p:blipFill>
+          <a:blip r:embed="rId5">
+            <a:extLst>
+              <a:ext uri="{28A0092B-C50C-407E-A947-70E740481C1C}">
+                <a14:useLocalDpi xmlns:a14="http://schemas.microsoft.com/office/drawing/2010/main" val="0"/>
+              </a:ext>
+            </a:extLst>
+          </a:blip>
+          <a:stretch>
+            <a:fillRect/>
+          </a:stretch>
+        </p:blipFill>
+        <p:spPr>
+          <a:xfrm>
+            <a:off x="4340526" y="90799"/>
+            <a:ext cx="1280260" cy="1293990"/>
+          </a:xfrm>
+          <a:prstGeom prst="rect">
+            <a:avLst/>
+          </a:prstGeom>
+        </p:spPr>
+      </p:pic>
+      <p:cxnSp>
+        <p:nvCxnSpPr>
+          <p:cNvPr id="65" name="Straight Connector 64"/>
+          <p:cNvCxnSpPr/>
+          <p:nvPr/>
+        </p:nvCxnSpPr>
+        <p:spPr>
+          <a:xfrm>
+            <a:off x="489461" y="1150209"/>
+            <a:ext cx="1349337" cy="2061"/>
+          </a:xfrm>
+          <a:prstGeom prst="line">
+            <a:avLst/>
+          </a:prstGeom>
+          <a:ln w="57150" cmpd="sng">
+            <a:solidFill>
+              <a:srgbClr val="FF0000"/>
+            </a:solidFill>
+          </a:ln>
+        </p:spPr>
+        <p:style>
+          <a:lnRef idx="2">
+            <a:schemeClr val="accent1"/>
+          </a:lnRef>
+          <a:fillRef idx="0">
+            <a:schemeClr val="accent1"/>
+          </a:fillRef>
+          <a:effectRef idx="1">
+            <a:schemeClr val="accent1"/>
+          </a:effectRef>
+          <a:fontRef idx="minor">
+            <a:schemeClr val="tx1"/>
+          </a:fontRef>
+        </p:style>
+      </p:cxnSp>
+      <p:cxnSp>
+        <p:nvCxnSpPr>
+          <p:cNvPr id="66" name="Straight Connector 65"/>
+          <p:cNvCxnSpPr/>
+          <p:nvPr/>
+        </p:nvCxnSpPr>
+        <p:spPr>
+          <a:xfrm>
+            <a:off x="487404" y="1439905"/>
+            <a:ext cx="1349337" cy="2061"/>
+          </a:xfrm>
+          <a:prstGeom prst="line">
+            <a:avLst/>
+          </a:prstGeom>
+          <a:ln w="57150" cmpd="sng">
+            <a:solidFill>
+              <a:schemeClr val="tx1"/>
+            </a:solidFill>
+          </a:ln>
+        </p:spPr>
+        <p:style>
+          <a:lnRef idx="2">
+            <a:schemeClr val="accent1"/>
+          </a:lnRef>
+          <a:fillRef idx="0">
+            <a:schemeClr val="accent1"/>
+          </a:fillRef>
+          <a:effectRef idx="1">
+            <a:schemeClr val="accent1"/>
+          </a:effectRef>
+          <a:fontRef idx="minor">
+            <a:schemeClr val="tx1"/>
+          </a:fontRef>
+        </p:style>
+      </p:cxnSp>
+      <p:cxnSp>
+        <p:nvCxnSpPr>
+          <p:cNvPr id="67" name="Straight Connector 66"/>
+          <p:cNvCxnSpPr/>
+          <p:nvPr/>
+        </p:nvCxnSpPr>
+        <p:spPr>
+          <a:xfrm>
+            <a:off x="493920" y="1755348"/>
+            <a:ext cx="1349337" cy="2061"/>
+          </a:xfrm>
+          <a:prstGeom prst="line">
+            <a:avLst/>
+          </a:prstGeom>
+          <a:ln w="57150" cmpd="sng">
+            <a:solidFill>
+              <a:srgbClr val="33CC33"/>
+            </a:solidFill>
+          </a:ln>
+        </p:spPr>
+        <p:style>
+          <a:lnRef idx="2">
+            <a:schemeClr val="accent1"/>
+          </a:lnRef>
+          <a:fillRef idx="0">
+            <a:schemeClr val="accent1"/>
+          </a:fillRef>
+          <a:effectRef idx="1">
+            <a:schemeClr val="accent1"/>
+          </a:effectRef>
+          <a:fontRef idx="minor">
+            <a:schemeClr val="tx1"/>
+          </a:fontRef>
+        </p:style>
+      </p:cxnSp>
+      <p:cxnSp>
+        <p:nvCxnSpPr>
+          <p:cNvPr id="68" name="Straight Connector 67"/>
+          <p:cNvCxnSpPr/>
+          <p:nvPr/>
+        </p:nvCxnSpPr>
+        <p:spPr>
+          <a:xfrm>
+            <a:off x="493921" y="2072852"/>
+            <a:ext cx="1349337" cy="2061"/>
+          </a:xfrm>
+          <a:prstGeom prst="line">
+            <a:avLst/>
+          </a:prstGeom>
+          <a:ln w="57150" cmpd="sng">
+            <a:solidFill>
+              <a:srgbClr val="FFFF00"/>
+            </a:solidFill>
+          </a:ln>
+        </p:spPr>
+        <p:style>
+          <a:lnRef idx="2">
+            <a:schemeClr val="accent1"/>
+          </a:lnRef>
+          <a:fillRef idx="0">
+            <a:schemeClr val="accent1"/>
+          </a:fillRef>
+          <a:effectRef idx="1">
+            <a:schemeClr val="accent1"/>
+          </a:effectRef>
+          <a:fontRef idx="minor">
+            <a:schemeClr val="tx1"/>
+          </a:fontRef>
+        </p:style>
+      </p:cxnSp>
+      <p:cxnSp>
+        <p:nvCxnSpPr>
+          <p:cNvPr id="69" name="Straight Connector 68"/>
+          <p:cNvCxnSpPr/>
+          <p:nvPr/>
+        </p:nvCxnSpPr>
+        <p:spPr>
+          <a:xfrm>
+            <a:off x="500437" y="2388295"/>
+            <a:ext cx="1349337" cy="2061"/>
+          </a:xfrm>
+          <a:prstGeom prst="line">
+            <a:avLst/>
+          </a:prstGeom>
+          <a:ln w="57150" cmpd="sng">
+            <a:solidFill>
+              <a:srgbClr val="0000FF"/>
+            </a:solidFill>
+          </a:ln>
+        </p:spPr>
+        <p:style>
+          <a:lnRef idx="2">
+            <a:schemeClr val="accent1"/>
+          </a:lnRef>
+          <a:fillRef idx="0">
+            <a:schemeClr val="accent1"/>
+          </a:fillRef>
+          <a:effectRef idx="1">
+            <a:schemeClr val="accent1"/>
+          </a:effectRef>
+          <a:fontRef idx="minor">
+            <a:schemeClr val="tx1"/>
+          </a:fontRef>
+        </p:style>
+      </p:cxnSp>
+      <p:cxnSp>
+        <p:nvCxnSpPr>
+          <p:cNvPr id="70" name="Straight Connector 69"/>
+          <p:cNvCxnSpPr/>
+          <p:nvPr/>
+        </p:nvCxnSpPr>
+        <p:spPr>
+          <a:xfrm>
+            <a:off x="498373" y="2738062"/>
+            <a:ext cx="1349337" cy="2061"/>
+          </a:xfrm>
+          <a:prstGeom prst="line">
+            <a:avLst/>
+          </a:prstGeom>
+          <a:ln w="57150" cmpd="sng">
+            <a:solidFill>
+              <a:schemeClr val="bg1">
+                <a:lumMod val="75000"/>
+              </a:schemeClr>
+            </a:solidFill>
+          </a:ln>
+        </p:spPr>
+        <p:style>
+          <a:lnRef idx="2">
+            <a:schemeClr val="accent1"/>
+          </a:lnRef>
+          <a:fillRef idx="0">
+            <a:schemeClr val="accent1"/>
+          </a:fillRef>
+          <a:effectRef idx="1">
+            <a:schemeClr val="accent1"/>
+          </a:effectRef>
+          <a:fontRef idx="minor">
+            <a:schemeClr val="tx1"/>
+          </a:fontRef>
+        </p:style>
+      </p:cxnSp>
+      <p:sp>
+        <p:nvSpPr>
+          <p:cNvPr id="71" name="TextBox 70"/>
+          <p:cNvSpPr txBox="1"/>
+          <p:nvPr/>
+        </p:nvSpPr>
+        <p:spPr>
+          <a:xfrm>
+            <a:off x="2055957" y="2237971"/>
+            <a:ext cx="561008" cy="307777"/>
+          </a:xfrm>
+          <a:prstGeom prst="rect">
+            <a:avLst/>
+          </a:prstGeom>
+          <a:noFill/>
+        </p:spPr>
+        <p:txBody>
+          <a:bodyPr wrap="none" rtlCol="0">
+            <a:spAutoFit/>
+          </a:bodyPr>
+          <a:lstStyle/>
+          <a:p>
+            <a:r>
+              <a:rPr lang="en-US" sz="1400" dirty="0" smtClean="0">
+                <a:latin typeface="Arial Narrow"/>
+                <a:cs typeface="Arial Narrow"/>
+              </a:rPr>
+              <a:t>MISO</a:t>
+            </a:r>
+            <a:endParaRPr lang="en-US" sz="1400" dirty="0">
+              <a:latin typeface="Arial Narrow"/>
+              <a:cs typeface="Arial Narrow"/>
+            </a:endParaRPr>
+          </a:p>
+        </p:txBody>
+      </p:sp>
+      <p:sp>
+        <p:nvSpPr>
+          <p:cNvPr id="72" name="TextBox 71"/>
+          <p:cNvSpPr txBox="1"/>
+          <p:nvPr/>
+        </p:nvSpPr>
+        <p:spPr>
+          <a:xfrm>
+            <a:off x="2055957" y="1607489"/>
+            <a:ext cx="487283" cy="307777"/>
+          </a:xfrm>
+          <a:prstGeom prst="rect">
+            <a:avLst/>
+          </a:prstGeom>
+          <a:noFill/>
+        </p:spPr>
+        <p:txBody>
+          <a:bodyPr wrap="none" rtlCol="0">
+            <a:spAutoFit/>
+          </a:bodyPr>
+          <a:lstStyle/>
+          <a:p>
+            <a:r>
+              <a:rPr lang="en-US" sz="1400" dirty="0" smtClean="0">
+                <a:latin typeface="Arial Narrow"/>
+                <a:cs typeface="Arial Narrow"/>
+              </a:rPr>
+              <a:t>SCK</a:t>
+            </a:r>
+            <a:endParaRPr lang="en-US" sz="1400" dirty="0">
+              <a:latin typeface="Arial Narrow"/>
+              <a:cs typeface="Arial Narrow"/>
+            </a:endParaRPr>
+          </a:p>
+        </p:txBody>
+      </p:sp>
+      <p:sp>
+        <p:nvSpPr>
+          <p:cNvPr id="73" name="TextBox 72"/>
+          <p:cNvSpPr txBox="1"/>
+          <p:nvPr/>
+        </p:nvSpPr>
+        <p:spPr>
+          <a:xfrm>
+            <a:off x="2055957" y="1286062"/>
+            <a:ext cx="511741" cy="307777"/>
+          </a:xfrm>
+          <a:prstGeom prst="rect">
+            <a:avLst/>
+          </a:prstGeom>
+          <a:noFill/>
+        </p:spPr>
+        <p:txBody>
+          <a:bodyPr wrap="none" rtlCol="0">
+            <a:spAutoFit/>
+          </a:bodyPr>
+          <a:lstStyle/>
+          <a:p>
+            <a:r>
+              <a:rPr lang="en-US" sz="1400" dirty="0" smtClean="0">
+                <a:latin typeface="Arial Narrow"/>
+                <a:cs typeface="Arial Narrow"/>
+              </a:rPr>
+              <a:t>GND</a:t>
+            </a:r>
+            <a:endParaRPr lang="en-US" sz="1400" dirty="0">
+              <a:latin typeface="Arial Narrow"/>
+              <a:cs typeface="Arial Narrow"/>
+            </a:endParaRPr>
+          </a:p>
+        </p:txBody>
+      </p:sp>
+      <p:sp>
+        <p:nvSpPr>
+          <p:cNvPr id="74" name="TextBox 73"/>
+          <p:cNvSpPr txBox="1"/>
+          <p:nvPr/>
+        </p:nvSpPr>
+        <p:spPr>
+          <a:xfrm>
+            <a:off x="2055957" y="995096"/>
+            <a:ext cx="495348" cy="307777"/>
+          </a:xfrm>
+          <a:prstGeom prst="rect">
+            <a:avLst/>
+          </a:prstGeom>
+          <a:noFill/>
+        </p:spPr>
+        <p:txBody>
+          <a:bodyPr wrap="none" rtlCol="0">
+            <a:spAutoFit/>
+          </a:bodyPr>
+          <a:lstStyle/>
+          <a:p>
+            <a:r>
+              <a:rPr lang="en-US" sz="1400" dirty="0" smtClean="0">
+                <a:latin typeface="Arial Narrow"/>
+                <a:cs typeface="Arial Narrow"/>
+              </a:rPr>
+              <a:t>VCC</a:t>
+            </a:r>
+            <a:endParaRPr lang="en-US" sz="1400" dirty="0">
+              <a:latin typeface="Arial Narrow"/>
+              <a:cs typeface="Arial Narrow"/>
+            </a:endParaRPr>
+          </a:p>
+        </p:txBody>
+      </p:sp>
+      <p:sp>
+        <p:nvSpPr>
+          <p:cNvPr id="75" name="TextBox 74"/>
+          <p:cNvSpPr txBox="1"/>
+          <p:nvPr/>
+        </p:nvSpPr>
+        <p:spPr>
+          <a:xfrm>
+            <a:off x="2055957" y="1919206"/>
+            <a:ext cx="561008" cy="307777"/>
+          </a:xfrm>
+          <a:prstGeom prst="rect">
+            <a:avLst/>
+          </a:prstGeom>
+          <a:noFill/>
+        </p:spPr>
+        <p:txBody>
+          <a:bodyPr wrap="none" rtlCol="0">
+            <a:spAutoFit/>
+          </a:bodyPr>
+          <a:lstStyle/>
+          <a:p>
+            <a:r>
+              <a:rPr lang="en-US" sz="1400" dirty="0" smtClean="0">
+                <a:latin typeface="Arial Narrow"/>
+                <a:cs typeface="Arial Narrow"/>
+              </a:rPr>
+              <a:t>MOSI</a:t>
+            </a:r>
+            <a:endParaRPr lang="en-US" sz="1400" dirty="0">
+              <a:latin typeface="Arial Narrow"/>
+              <a:cs typeface="Arial Narrow"/>
+            </a:endParaRPr>
+          </a:p>
+        </p:txBody>
+      </p:sp>
+      <p:sp>
+        <p:nvSpPr>
+          <p:cNvPr id="76" name="TextBox 75"/>
+          <p:cNvSpPr txBox="1"/>
+          <p:nvPr/>
+        </p:nvSpPr>
+        <p:spPr>
+          <a:xfrm>
+            <a:off x="2055957" y="2603640"/>
+            <a:ext cx="381034" cy="307777"/>
+          </a:xfrm>
+          <a:prstGeom prst="rect">
+            <a:avLst/>
+          </a:prstGeom>
+          <a:noFill/>
+        </p:spPr>
+        <p:txBody>
+          <a:bodyPr wrap="none" rtlCol="0">
+            <a:spAutoFit/>
+          </a:bodyPr>
+          <a:lstStyle/>
+          <a:p>
+            <a:r>
+              <a:rPr lang="en-US" sz="1400" dirty="0" smtClean="0">
+                <a:latin typeface="Arial Narrow"/>
+                <a:cs typeface="Arial Narrow"/>
+              </a:rPr>
+              <a:t>SS</a:t>
+            </a:r>
+            <a:endParaRPr lang="en-US" sz="1400" dirty="0">
+              <a:latin typeface="Arial Narrow"/>
+              <a:cs typeface="Arial Narrow"/>
+            </a:endParaRPr>
+          </a:p>
+        </p:txBody>
+      </p:sp>
+      <p:sp>
+        <p:nvSpPr>
+          <p:cNvPr id="77" name="TextBox 76"/>
+          <p:cNvSpPr txBox="1"/>
+          <p:nvPr/>
+        </p:nvSpPr>
+        <p:spPr>
+          <a:xfrm>
+            <a:off x="2055957" y="2927664"/>
+            <a:ext cx="419255" cy="307777"/>
+          </a:xfrm>
+          <a:prstGeom prst="rect">
+            <a:avLst/>
+          </a:prstGeom>
+          <a:noFill/>
+        </p:spPr>
+        <p:txBody>
+          <a:bodyPr wrap="none" rtlCol="0">
+            <a:spAutoFit/>
+          </a:bodyPr>
+          <a:lstStyle/>
+          <a:p>
+            <a:r>
+              <a:rPr lang="en-US" sz="1400" dirty="0" smtClean="0">
+                <a:latin typeface="Arial Narrow"/>
+                <a:cs typeface="Arial Narrow"/>
+              </a:rPr>
+              <a:t>INT</a:t>
+            </a:r>
+            <a:endParaRPr lang="en-US" sz="1400" dirty="0">
+              <a:latin typeface="Arial Narrow"/>
+              <a:cs typeface="Arial Narrow"/>
+            </a:endParaRPr>
+          </a:p>
+        </p:txBody>
+      </p:sp>
+      <p:sp>
+        <p:nvSpPr>
+          <p:cNvPr id="78" name="TextBox 77"/>
+          <p:cNvSpPr txBox="1"/>
+          <p:nvPr/>
+        </p:nvSpPr>
+        <p:spPr>
+          <a:xfrm>
+            <a:off x="2055957" y="582931"/>
+            <a:ext cx="421973" cy="307777"/>
+          </a:xfrm>
+          <a:prstGeom prst="rect">
+            <a:avLst/>
+          </a:prstGeom>
+          <a:noFill/>
+        </p:spPr>
+        <p:txBody>
+          <a:bodyPr wrap="none" rtlCol="0">
+            <a:spAutoFit/>
+          </a:bodyPr>
+          <a:lstStyle/>
+          <a:p>
+            <a:r>
+              <a:rPr lang="en-US" sz="1400" dirty="0" smtClean="0">
+                <a:latin typeface="Arial Narrow"/>
+                <a:cs typeface="Arial Narrow"/>
+              </a:rPr>
+              <a:t>SPI</a:t>
+            </a:r>
+            <a:endParaRPr lang="en-US" sz="1400" dirty="0">
+              <a:latin typeface="Arial Narrow"/>
+              <a:cs typeface="Arial Narrow"/>
+            </a:endParaRPr>
+          </a:p>
+        </p:txBody>
+      </p:sp>
+      <p:cxnSp>
+        <p:nvCxnSpPr>
+          <p:cNvPr id="79" name="Straight Connector 78"/>
+          <p:cNvCxnSpPr/>
+          <p:nvPr/>
+        </p:nvCxnSpPr>
+        <p:spPr>
+          <a:xfrm>
+            <a:off x="487727" y="3079248"/>
+            <a:ext cx="1349337" cy="2061"/>
+          </a:xfrm>
+          <a:prstGeom prst="line">
+            <a:avLst/>
+          </a:prstGeom>
+          <a:ln w="57150" cmpd="sng">
+            <a:solidFill>
+              <a:srgbClr val="00FFFF"/>
+            </a:solidFill>
+          </a:ln>
+        </p:spPr>
+        <p:style>
+          <a:lnRef idx="2">
+            <a:schemeClr val="accent1"/>
+          </a:lnRef>
+          <a:fillRef idx="0">
+            <a:schemeClr val="accent1"/>
+          </a:fillRef>
+          <a:effectRef idx="1">
+            <a:schemeClr val="accent1"/>
+          </a:effectRef>
+          <a:fontRef idx="minor">
+            <a:schemeClr val="tx1"/>
+          </a:fontRef>
+        </p:style>
+      </p:cxnSp>
+      <p:sp>
+        <p:nvSpPr>
+          <p:cNvPr id="88" name="TextBox 87"/>
+          <p:cNvSpPr txBox="1"/>
+          <p:nvPr/>
+        </p:nvSpPr>
+        <p:spPr>
+          <a:xfrm>
+            <a:off x="2843378" y="2244494"/>
+            <a:ext cx="1330437" cy="307777"/>
+          </a:xfrm>
+          <a:prstGeom prst="rect">
+            <a:avLst/>
+          </a:prstGeom>
+          <a:noFill/>
+        </p:spPr>
+        <p:txBody>
+          <a:bodyPr wrap="none" rtlCol="0">
+            <a:spAutoFit/>
+          </a:bodyPr>
+          <a:lstStyle/>
+          <a:p>
+            <a:r>
+              <a:rPr lang="en-US" sz="1400" dirty="0" smtClean="0">
+                <a:latin typeface="Arial Narrow"/>
+                <a:cs typeface="Arial Narrow"/>
+              </a:rPr>
+              <a:t>Address select *1</a:t>
+            </a:r>
+            <a:endParaRPr lang="en-US" sz="1400" dirty="0">
+              <a:latin typeface="Arial Narrow"/>
+              <a:cs typeface="Arial Narrow"/>
+            </a:endParaRPr>
+          </a:p>
+        </p:txBody>
+      </p:sp>
+      <p:sp>
+        <p:nvSpPr>
+          <p:cNvPr id="89" name="TextBox 88"/>
+          <p:cNvSpPr txBox="1"/>
+          <p:nvPr/>
+        </p:nvSpPr>
+        <p:spPr>
+          <a:xfrm>
+            <a:off x="2843378" y="1614012"/>
+            <a:ext cx="466794" cy="307777"/>
+          </a:xfrm>
+          <a:prstGeom prst="rect">
+            <a:avLst/>
+          </a:prstGeom>
+          <a:noFill/>
+        </p:spPr>
+        <p:txBody>
+          <a:bodyPr wrap="none" rtlCol="0">
+            <a:spAutoFit/>
+          </a:bodyPr>
+          <a:lstStyle/>
+          <a:p>
+            <a:r>
+              <a:rPr lang="en-US" sz="1400" dirty="0" smtClean="0">
+                <a:latin typeface="Arial Narrow"/>
+                <a:cs typeface="Arial Narrow"/>
+              </a:rPr>
+              <a:t>SCL</a:t>
+            </a:r>
+            <a:endParaRPr lang="en-US" sz="1400" dirty="0">
+              <a:latin typeface="Arial Narrow"/>
+              <a:cs typeface="Arial Narrow"/>
+            </a:endParaRPr>
+          </a:p>
+        </p:txBody>
+      </p:sp>
+      <p:sp>
+        <p:nvSpPr>
+          <p:cNvPr id="90" name="TextBox 89"/>
+          <p:cNvSpPr txBox="1"/>
+          <p:nvPr/>
+        </p:nvSpPr>
+        <p:spPr>
+          <a:xfrm>
+            <a:off x="2843378" y="1292585"/>
+            <a:ext cx="511741" cy="307777"/>
+          </a:xfrm>
+          <a:prstGeom prst="rect">
+            <a:avLst/>
+          </a:prstGeom>
+          <a:noFill/>
+        </p:spPr>
+        <p:txBody>
+          <a:bodyPr wrap="none" rtlCol="0">
+            <a:spAutoFit/>
+          </a:bodyPr>
+          <a:lstStyle/>
+          <a:p>
+            <a:r>
+              <a:rPr lang="en-US" sz="1400" dirty="0" smtClean="0">
+                <a:latin typeface="Arial Narrow"/>
+                <a:cs typeface="Arial Narrow"/>
+              </a:rPr>
+              <a:t>GND</a:t>
+            </a:r>
+            <a:endParaRPr lang="en-US" sz="1400" dirty="0">
+              <a:latin typeface="Arial Narrow"/>
+              <a:cs typeface="Arial Narrow"/>
+            </a:endParaRPr>
+          </a:p>
+        </p:txBody>
+      </p:sp>
+      <p:sp>
+        <p:nvSpPr>
+          <p:cNvPr id="91" name="TextBox 90"/>
+          <p:cNvSpPr txBox="1"/>
+          <p:nvPr/>
+        </p:nvSpPr>
+        <p:spPr>
+          <a:xfrm>
+            <a:off x="2843378" y="1001619"/>
+            <a:ext cx="495348" cy="307777"/>
+          </a:xfrm>
+          <a:prstGeom prst="rect">
+            <a:avLst/>
+          </a:prstGeom>
+          <a:noFill/>
+        </p:spPr>
+        <p:txBody>
+          <a:bodyPr wrap="none" rtlCol="0">
+            <a:spAutoFit/>
+          </a:bodyPr>
+          <a:lstStyle/>
+          <a:p>
+            <a:r>
+              <a:rPr lang="en-US" sz="1400" dirty="0" smtClean="0">
+                <a:latin typeface="Arial Narrow"/>
+                <a:cs typeface="Arial Narrow"/>
+              </a:rPr>
+              <a:t>VCC</a:t>
+            </a:r>
+            <a:endParaRPr lang="en-US" sz="1400" dirty="0">
+              <a:latin typeface="Arial Narrow"/>
+              <a:cs typeface="Arial Narrow"/>
+            </a:endParaRPr>
+          </a:p>
+        </p:txBody>
+      </p:sp>
+      <p:sp>
+        <p:nvSpPr>
+          <p:cNvPr id="92" name="TextBox 91"/>
+          <p:cNvSpPr txBox="1"/>
+          <p:nvPr/>
+        </p:nvSpPr>
+        <p:spPr>
+          <a:xfrm>
+            <a:off x="2843378" y="1925729"/>
+            <a:ext cx="479618" cy="307777"/>
+          </a:xfrm>
+          <a:prstGeom prst="rect">
+            <a:avLst/>
+          </a:prstGeom>
+          <a:noFill/>
+        </p:spPr>
+        <p:txBody>
+          <a:bodyPr wrap="none" rtlCol="0">
+            <a:spAutoFit/>
+          </a:bodyPr>
+          <a:lstStyle/>
+          <a:p>
+            <a:r>
+              <a:rPr lang="en-US" sz="1400" dirty="0" smtClean="0">
+                <a:latin typeface="Arial Narrow"/>
+                <a:cs typeface="Arial Narrow"/>
+              </a:rPr>
+              <a:t>SDA</a:t>
+            </a:r>
+            <a:endParaRPr lang="en-US" sz="1400" dirty="0">
+              <a:latin typeface="Arial Narrow"/>
+              <a:cs typeface="Arial Narrow"/>
+            </a:endParaRPr>
+          </a:p>
+        </p:txBody>
+      </p:sp>
+      <p:sp>
+        <p:nvSpPr>
+          <p:cNvPr id="93" name="TextBox 92"/>
+          <p:cNvSpPr txBox="1"/>
+          <p:nvPr/>
+        </p:nvSpPr>
+        <p:spPr>
+          <a:xfrm>
+            <a:off x="2843378" y="2610163"/>
+            <a:ext cx="233670" cy="307777"/>
+          </a:xfrm>
+          <a:prstGeom prst="rect">
+            <a:avLst/>
+          </a:prstGeom>
+          <a:noFill/>
+        </p:spPr>
+        <p:txBody>
+          <a:bodyPr wrap="none" rtlCol="0">
+            <a:spAutoFit/>
+          </a:bodyPr>
+          <a:lstStyle/>
+          <a:p>
+            <a:r>
+              <a:rPr lang="en-US" sz="1400" dirty="0" smtClean="0">
+                <a:latin typeface="Arial Narrow"/>
+                <a:cs typeface="Arial Narrow"/>
+              </a:rPr>
+              <a:t>-</a:t>
+            </a:r>
+            <a:endParaRPr lang="en-US" sz="1400" dirty="0">
+              <a:latin typeface="Arial Narrow"/>
+              <a:cs typeface="Arial Narrow"/>
+            </a:endParaRPr>
+          </a:p>
+        </p:txBody>
+      </p:sp>
+      <p:sp>
+        <p:nvSpPr>
+          <p:cNvPr id="94" name="TextBox 93"/>
+          <p:cNvSpPr txBox="1"/>
+          <p:nvPr/>
+        </p:nvSpPr>
+        <p:spPr>
+          <a:xfrm>
+            <a:off x="2843378" y="2934187"/>
+            <a:ext cx="419255" cy="307777"/>
+          </a:xfrm>
+          <a:prstGeom prst="rect">
+            <a:avLst/>
+          </a:prstGeom>
+          <a:noFill/>
+        </p:spPr>
+        <p:txBody>
+          <a:bodyPr wrap="none" rtlCol="0">
+            <a:spAutoFit/>
+          </a:bodyPr>
+          <a:lstStyle/>
+          <a:p>
+            <a:r>
+              <a:rPr lang="en-US" sz="1400" dirty="0" smtClean="0">
+                <a:latin typeface="Arial Narrow"/>
+                <a:cs typeface="Arial Narrow"/>
+              </a:rPr>
+              <a:t>INT</a:t>
+            </a:r>
+            <a:endParaRPr lang="en-US" sz="1400" dirty="0">
+              <a:latin typeface="Arial Narrow"/>
+              <a:cs typeface="Arial Narrow"/>
+            </a:endParaRPr>
+          </a:p>
+        </p:txBody>
+      </p:sp>
+      <p:sp>
+        <p:nvSpPr>
+          <p:cNvPr id="95" name="TextBox 94"/>
+          <p:cNvSpPr txBox="1"/>
+          <p:nvPr/>
+        </p:nvSpPr>
+        <p:spPr>
+          <a:xfrm>
+            <a:off x="2843378" y="589454"/>
+            <a:ext cx="413733" cy="307777"/>
+          </a:xfrm>
+          <a:prstGeom prst="rect">
+            <a:avLst/>
+          </a:prstGeom>
+          <a:noFill/>
+        </p:spPr>
+        <p:txBody>
+          <a:bodyPr wrap="none" rtlCol="0">
+            <a:spAutoFit/>
+          </a:bodyPr>
+          <a:lstStyle/>
+          <a:p>
+            <a:r>
+              <a:rPr lang="en-US" sz="1400" dirty="0" smtClean="0">
+                <a:latin typeface="Arial Narrow"/>
+                <a:cs typeface="Arial Narrow"/>
+              </a:rPr>
+              <a:t>I2C</a:t>
+            </a:r>
+            <a:endParaRPr lang="en-US" sz="1400" dirty="0">
+              <a:latin typeface="Arial Narrow"/>
+              <a:cs typeface="Arial Narrow"/>
+            </a:endParaRPr>
+          </a:p>
+        </p:txBody>
+      </p:sp>
+      <p:sp>
+        <p:nvSpPr>
+          <p:cNvPr id="101" name="TextBox 100"/>
+          <p:cNvSpPr txBox="1"/>
+          <p:nvPr/>
+        </p:nvSpPr>
+        <p:spPr>
+          <a:xfrm>
+            <a:off x="1382483" y="3404091"/>
+            <a:ext cx="2518638" cy="307777"/>
+          </a:xfrm>
+          <a:prstGeom prst="rect">
+            <a:avLst/>
+          </a:prstGeom>
+          <a:noFill/>
+        </p:spPr>
+        <p:txBody>
+          <a:bodyPr wrap="none" rtlCol="0">
+            <a:spAutoFit/>
+          </a:bodyPr>
+          <a:lstStyle/>
+          <a:p>
+            <a:r>
+              <a:rPr lang="en-US" sz="1400" dirty="0" smtClean="0">
+                <a:latin typeface="Arial Narrow"/>
+                <a:cs typeface="Arial Narrow"/>
+              </a:rPr>
+              <a:t>*</a:t>
+            </a:r>
+            <a:r>
+              <a:rPr lang="en-US" sz="1400" dirty="0">
+                <a:latin typeface="Arial Narrow"/>
+                <a:cs typeface="Arial Narrow"/>
+              </a:rPr>
+              <a:t>1</a:t>
+            </a:r>
+            <a:r>
+              <a:rPr lang="en-US" sz="1400" dirty="0" smtClean="0">
+                <a:latin typeface="Arial Narrow"/>
+                <a:cs typeface="Arial Narrow"/>
+              </a:rPr>
+              <a:t> </a:t>
+            </a:r>
+            <a:r>
+              <a:rPr lang="en-US" sz="1400" dirty="0" smtClean="0"/>
+              <a:t>GND </a:t>
+            </a:r>
+            <a:r>
+              <a:rPr lang="en-US" sz="1400" dirty="0"/>
+              <a:t>for default </a:t>
+            </a:r>
+            <a:r>
+              <a:rPr lang="en-US" sz="1400" dirty="0" smtClean="0"/>
+              <a:t>address 0x68</a:t>
+            </a:r>
+            <a:r>
+              <a:rPr lang="en-US" sz="1400" dirty="0" smtClean="0">
+                <a:latin typeface="Arial Narrow"/>
+                <a:cs typeface="Arial Narrow"/>
+              </a:rPr>
+              <a:t> </a:t>
+            </a:r>
+            <a:endParaRPr lang="en-US" sz="1400" dirty="0">
+              <a:latin typeface="Arial Narrow"/>
+              <a:cs typeface="Arial Narrow"/>
+            </a:endParaRPr>
+          </a:p>
+        </p:txBody>
+      </p:sp>
+    </p:spTree>
+    <p:extLst>
+      <p:ext uri="{BB962C8B-B14F-4D97-AF65-F5344CB8AC3E}">
+        <p14:creationId xmlns:p14="http://schemas.microsoft.com/office/powerpoint/2010/main" val="985409606"/>
+      </p:ext>
+    </p:extLst>
+  </p:cSld>
+  <p:clrMapOvr>
+    <a:masterClrMapping/>
+  </p:clrMapOvr>
+  <p:timing>
+    <p:tnLst>
+      <p:par>
+        <p:cTn xmlns:p14="http://schemas.microsoft.com/office/powerpoint/2010/main" id="1" dur="indefinite" restart="never" nodeType="tmRoot"/>
+      </p:par>
+    </p:tnLst>
+  </p:timing>
+</p:sld>
+</file>
+
+<file path=ppt/slides/slide4.xml><?xml version="1.0" encoding="utf-8"?>
+<p:sld xmlns:a="http://schemas.openxmlformats.org/drawingml/2006/main" xmlns:r="http://schemas.openxmlformats.org/officeDocument/2006/relationships" xmlns:p="http://schemas.openxmlformats.org/presentationml/2006/main">
+  <p:cSld>
+    <p:spTree>
+      <p:nvGrpSpPr>
+        <p:cNvPr id="1" name=""/>
+        <p:cNvGrpSpPr/>
+        <p:nvPr/>
+      </p:nvGrpSpPr>
+      <p:grpSpPr>
+        <a:xfrm>
+          <a:off x="0" y="0"/>
+          <a:ext cx="0" cy="0"/>
+          <a:chOff x="0" y="0"/>
+          <a:chExt cx="0" cy="0"/>
+        </a:xfrm>
+      </p:grpSpPr>
+      <p:sp>
+        <p:nvSpPr>
+          <p:cNvPr id="2" name="Date Placeholder 1"/>
+          <p:cNvSpPr>
+            <a:spLocks noGrp="1"/>
+          </p:cNvSpPr>
+          <p:nvPr>
+            <p:ph type="dt" sz="half" idx="10"/>
+          </p:nvPr>
+        </p:nvSpPr>
+        <p:spPr/>
+        <p:txBody>
+          <a:bodyPr/>
+          <a:lstStyle/>
+          <a:p>
+            <a:fld id="{BE3AE64F-59D5-1541-93FB-F8431E953C54}" type="datetimeFigureOut">
+              <a:rPr lang="en-US" smtClean="0"/>
+              <a:t>17/05/01</a:t>
+            </a:fld>
+            <a:endParaRPr lang="en-US"/>
+          </a:p>
+        </p:txBody>
+      </p:sp>
+      <p:sp>
+        <p:nvSpPr>
+          <p:cNvPr id="3" name="Footer Placeholder 2"/>
+          <p:cNvSpPr>
+            <a:spLocks noGrp="1"/>
+          </p:cNvSpPr>
+          <p:nvPr>
+            <p:ph type="ftr" sz="quarter" idx="11"/>
+          </p:nvPr>
+        </p:nvSpPr>
+        <p:spPr/>
+        <p:txBody>
+          <a:bodyPr/>
+          <a:lstStyle/>
+          <a:p>
+            <a:endParaRPr lang="en-US"/>
+          </a:p>
+        </p:txBody>
+      </p:sp>
+      <p:sp>
+        <p:nvSpPr>
+          <p:cNvPr id="4" name="Slide Number Placeholder 3"/>
+          <p:cNvSpPr>
+            <a:spLocks noGrp="1"/>
+          </p:cNvSpPr>
+          <p:nvPr>
+            <p:ph type="sldNum" sz="quarter" idx="12"/>
+          </p:nvPr>
+        </p:nvSpPr>
+        <p:spPr/>
+        <p:txBody>
+          <a:bodyPr/>
+          <a:lstStyle/>
+          <a:p>
+            <a:fld id="{2875A458-CA75-724E-8507-CF6DE86A334B}" type="slidenum">
+              <a:rPr lang="en-US" smtClean="0"/>
+              <a:t>4</a:t>
             </a:fld>
             <a:endParaRPr lang="en-US"/>
           </a:p>
@@ -6847,6 +10766,36 @@
           </a:prstGeom>
         </p:spPr>
       </p:pic>
+      <p:pic>
+        <p:nvPicPr>
+          <p:cNvPr id="32" name="Picture 31" descr="gy-bmi160-module-6dof-6-axis-rate-gyroscope-gravity-sensor-iic-spi.jpg"/>
+          <p:cNvPicPr>
+            <a:picLocks noChangeAspect="1"/>
+          </p:cNvPicPr>
+          <p:nvPr/>
+        </p:nvPicPr>
+        <p:blipFill>
+          <a:blip r:embed="rId3">
+            <a:extLst>
+              <a:ext uri="{28A0092B-C50C-407E-A947-70E740481C1C}">
+                <a14:useLocalDpi xmlns:a14="http://schemas.microsoft.com/office/drawing/2010/main" val="0"/>
+              </a:ext>
+            </a:extLst>
+          </a:blip>
+          <a:stretch>
+            <a:fillRect/>
+          </a:stretch>
+        </p:blipFill>
+        <p:spPr>
+          <a:xfrm>
+            <a:off x="1225495" y="3552612"/>
+            <a:ext cx="1726682" cy="1745199"/>
+          </a:xfrm>
+          <a:prstGeom prst="rect">
+            <a:avLst/>
+          </a:prstGeom>
+        </p:spPr>
+      </p:pic>
     </p:spTree>
     <p:extLst>
       <p:ext uri="{BB962C8B-B14F-4D97-AF65-F5344CB8AC3E}">

</xml_diff>